<commit_message>
Rectification fichier requirements.txt .gitignore
</commit_message>
<xml_diff>
--- a/soutenance_python.pptx
+++ b/soutenance_python.pptx
@@ -156,11 +156,7 @@
 <file path=ppt/revisionInfo.xml><?xml version="1.0" encoding="utf-8"?>
 <p1510:revInfo xmlns:a="http://schemas.openxmlformats.org/drawingml/2006/main" xmlns:r="http://schemas.openxmlformats.org/officeDocument/2006/relationships" xmlns:p1510="http://schemas.microsoft.com/office/powerpoint/2015/10/main">
   <p1510:revLst>
-    <p1510:client id="{55C062D2-0DB4-489F-A7C8-95C44F213725}" v="825" dt="2020-05-02T09:15:45.334"/>
-    <p1510:client id="{84B80816-FBFE-46CC-829B-7A96CA802701}" v="77" dt="2020-05-02T09:49:27.094"/>
     <p1510:client id="{E9C843FC-B124-4061-8C89-EE7FD8F3C8A3}" v="8" dt="2020-05-01T14:04:39.802"/>
-    <p1510:client id="{F1D63990-5919-43D1-AC89-027E19F59A60}" v="501" dt="2020-05-01T08:29:26.057"/>
-    <p1510:client id="{F76F3E65-47E3-4C2C-91A0-0312AEC85931}" v="653" dt="2020-05-02T09:39:45.978"/>
   </p1510:revLst>
 </p1510:revInfo>
 </file>
@@ -168,249 +164,125 @@
 <file path=ppt/changesInfos/changesInfo1.xml><?xml version="1.0" encoding="utf-8"?>
 <pc:chgInfo xmlns:a="http://schemas.openxmlformats.org/drawingml/2006/main" xmlns:r="http://schemas.openxmlformats.org/officeDocument/2006/relationships" xmlns:ac="http://schemas.microsoft.com/office/drawing/2013/main/command" xmlns:pc="http://schemas.microsoft.com/office/powerpoint/2013/main/command">
   <pc:docChgLst>
-    <pc:chgData name="alain desombre" userId="79cdecc42f8c13b8" providerId="LiveId" clId="{E9C843FC-B124-4061-8C89-EE7FD8F3C8A3}"/>
-    <pc:docChg chg="custSel addSld delSld modSld sldOrd">
-      <pc:chgData name="alain desombre" userId="79cdecc42f8c13b8" providerId="LiveId" clId="{E9C843FC-B124-4061-8C89-EE7FD8F3C8A3}" dt="2020-05-01T14:07:31.749" v="352" actId="20577"/>
+    <pc:chgData name="alain desombre" userId="79cdecc42f8c13b8" providerId="Windows Live" clId="Web-{9EC82C7A-1810-4786-B704-C78971D90367}"/>
+    <pc:docChg chg="modSld">
+      <pc:chgData name="alain desombre" userId="79cdecc42f8c13b8" providerId="Windows Live" clId="Web-{9EC82C7A-1810-4786-B704-C78971D90367}" dt="2020-05-03T13:48:02.937" v="12"/>
       <pc:docMkLst>
         <pc:docMk/>
       </pc:docMkLst>
-      <pc:sldChg chg="ord">
-        <pc:chgData name="alain desombre" userId="79cdecc42f8c13b8" providerId="LiveId" clId="{E9C843FC-B124-4061-8C89-EE7FD8F3C8A3}" dt="2020-05-01T13:42:37.339" v="96"/>
+      <pc:sldChg chg="addSp">
+        <pc:chgData name="alain desombre" userId="79cdecc42f8c13b8" providerId="Windows Live" clId="Web-{9EC82C7A-1810-4786-B704-C78971D90367}" dt="2020-05-03T13:48:02.937" v="12"/>
         <pc:sldMkLst>
           <pc:docMk/>
-          <pc:sldMk cId="3870336645" sldId="257"/>
+          <pc:sldMk cId="2228380559" sldId="266"/>
         </pc:sldMkLst>
-      </pc:sldChg>
-      <pc:sldChg chg="addSp modSp">
-        <pc:chgData name="alain desombre" userId="79cdecc42f8c13b8" providerId="LiveId" clId="{E9C843FC-B124-4061-8C89-EE7FD8F3C8A3}" dt="2020-05-01T14:01:12.433" v="312" actId="20577"/>
-        <pc:sldMkLst>
-          <pc:docMk/>
-          <pc:sldMk cId="2667983443" sldId="258"/>
-        </pc:sldMkLst>
-        <pc:spChg chg="add mod">
-          <ac:chgData name="alain desombre" userId="79cdecc42f8c13b8" providerId="LiveId" clId="{E9C843FC-B124-4061-8C89-EE7FD8F3C8A3}" dt="2020-05-01T14:01:12.433" v="312" actId="20577"/>
-          <ac:spMkLst>
+        <pc:inkChg chg="add">
+          <ac:chgData name="alain desombre" userId="79cdecc42f8c13b8" providerId="Windows Live" clId="Web-{9EC82C7A-1810-4786-B704-C78971D90367}" dt="2020-05-03T13:47:48.171" v="8"/>
+          <ac:inkMkLst>
             <pc:docMk/>
-            <pc:sldMk cId="2667983443" sldId="258"/>
-            <ac:spMk id="14" creationId="{E412B0E6-09D8-476C-82D0-194AE17351B6}"/>
-          </ac:spMkLst>
-        </pc:spChg>
+            <pc:sldMk cId="2228380559" sldId="266"/>
+            <ac:inkMk id="2" creationId="{78CB88BC-A410-47B1-885B-E7223FD2E23D}"/>
+          </ac:inkMkLst>
+        </pc:inkChg>
+        <pc:inkChg chg="add">
+          <ac:chgData name="alain desombre" userId="79cdecc42f8c13b8" providerId="Windows Live" clId="Web-{9EC82C7A-1810-4786-B704-C78971D90367}" dt="2020-05-03T13:47:51.921" v="9"/>
+          <ac:inkMkLst>
+            <pc:docMk/>
+            <pc:sldMk cId="2228380559" sldId="266"/>
+            <ac:inkMk id="4" creationId="{DCF8C50D-4E13-4AE2-956A-57D0A23D62FE}"/>
+          </ac:inkMkLst>
+        </pc:inkChg>
+        <pc:inkChg chg="add">
+          <ac:chgData name="alain desombre" userId="79cdecc42f8c13b8" providerId="Windows Live" clId="Web-{9EC82C7A-1810-4786-B704-C78971D90367}" dt="2020-05-03T13:47:55.406" v="10"/>
+          <ac:inkMkLst>
+            <pc:docMk/>
+            <pc:sldMk cId="2228380559" sldId="266"/>
+            <ac:inkMk id="5" creationId="{C79B4073-5079-4793-85E7-94233C1423E2}"/>
+          </ac:inkMkLst>
+        </pc:inkChg>
+        <pc:inkChg chg="add">
+          <ac:chgData name="alain desombre" userId="79cdecc42f8c13b8" providerId="Windows Live" clId="Web-{9EC82C7A-1810-4786-B704-C78971D90367}" dt="2020-05-03T13:47:59.578" v="11"/>
+          <ac:inkMkLst>
+            <pc:docMk/>
+            <pc:sldMk cId="2228380559" sldId="266"/>
+            <ac:inkMk id="6" creationId="{9A08BE55-1E38-409A-99E7-5C9A082CD9A7}"/>
+          </ac:inkMkLst>
+        </pc:inkChg>
+        <pc:inkChg chg="add">
+          <ac:chgData name="alain desombre" userId="79cdecc42f8c13b8" providerId="Windows Live" clId="Web-{9EC82C7A-1810-4786-B704-C78971D90367}" dt="2020-05-03T13:48:02.937" v="12"/>
+          <ac:inkMkLst>
+            <pc:docMk/>
+            <pc:sldMk cId="2228380559" sldId="266"/>
+            <ac:inkMk id="14" creationId="{F4F1187F-B6E4-4453-845D-F5D8369F3909}"/>
+          </ac:inkMkLst>
+        </pc:inkChg>
       </pc:sldChg>
       <pc:sldChg chg="modSp">
-        <pc:chgData name="alain desombre" userId="79cdecc42f8c13b8" providerId="LiveId" clId="{E9C843FC-B124-4061-8C89-EE7FD8F3C8A3}" dt="2020-04-29T16:35:54.631" v="78" actId="313"/>
-        <pc:sldMkLst>
-          <pc:docMk/>
-          <pc:sldMk cId="3048587470" sldId="268"/>
-        </pc:sldMkLst>
-        <pc:spChg chg="mod">
-          <ac:chgData name="alain desombre" userId="79cdecc42f8c13b8" providerId="LiveId" clId="{E9C843FC-B124-4061-8C89-EE7FD8F3C8A3}" dt="2020-04-29T16:35:54.631" v="78" actId="313"/>
-          <ac:spMkLst>
-            <pc:docMk/>
-            <pc:sldMk cId="3048587470" sldId="268"/>
-            <ac:spMk id="2" creationId="{712AD056-EC7C-4D1F-9D7E-D741D0FEE935}"/>
-          </ac:spMkLst>
-        </pc:spChg>
-      </pc:sldChg>
-      <pc:sldChg chg="modSp">
-        <pc:chgData name="alain desombre" userId="79cdecc42f8c13b8" providerId="LiveId" clId="{E9C843FC-B124-4061-8C89-EE7FD8F3C8A3}" dt="2020-04-29T16:35:07.805" v="76" actId="20577"/>
-        <pc:sldMkLst>
-          <pc:docMk/>
-          <pc:sldMk cId="1150103603" sldId="270"/>
-        </pc:sldMkLst>
-        <pc:spChg chg="mod">
-          <ac:chgData name="alain desombre" userId="79cdecc42f8c13b8" providerId="LiveId" clId="{E9C843FC-B124-4061-8C89-EE7FD8F3C8A3}" dt="2020-04-29T16:35:07.805" v="76" actId="20577"/>
-          <ac:spMkLst>
-            <pc:docMk/>
-            <pc:sldMk cId="1150103603" sldId="270"/>
-            <ac:spMk id="4" creationId="{23FF0368-5B71-4346-8EC9-170C0817FCC0}"/>
-          </ac:spMkLst>
-        </pc:spChg>
-      </pc:sldChg>
-      <pc:sldChg chg="addSp delSp modSp add">
-        <pc:chgData name="alain desombre" userId="79cdecc42f8c13b8" providerId="LiveId" clId="{E9C843FC-B124-4061-8C89-EE7FD8F3C8A3}" dt="2020-05-01T14:01:32.581" v="313" actId="1076"/>
-        <pc:sldMkLst>
-          <pc:docMk/>
-          <pc:sldMk cId="299401932" sldId="273"/>
-        </pc:sldMkLst>
-        <pc:spChg chg="del mod">
-          <ac:chgData name="alain desombre" userId="79cdecc42f8c13b8" providerId="LiveId" clId="{E9C843FC-B124-4061-8C89-EE7FD8F3C8A3}" dt="2020-05-01T13:40:30.778" v="84" actId="21"/>
-          <ac:spMkLst>
-            <pc:docMk/>
-            <pc:sldMk cId="299401932" sldId="273"/>
-            <ac:spMk id="2" creationId="{8C92AAEA-89C1-403B-B2E2-2FB9534FE3CE}"/>
-          </ac:spMkLst>
-        </pc:spChg>
-        <pc:spChg chg="del mod">
-          <ac:chgData name="alain desombre" userId="79cdecc42f8c13b8" providerId="LiveId" clId="{E9C843FC-B124-4061-8C89-EE7FD8F3C8A3}" dt="2020-05-01T13:41:13.234" v="87" actId="21"/>
-          <ac:spMkLst>
-            <pc:docMk/>
-            <pc:sldMk cId="299401932" sldId="273"/>
-            <ac:spMk id="3" creationId="{F03A26FC-CFD0-4E6A-916B-BAB88C1B912A}"/>
-          </ac:spMkLst>
-        </pc:spChg>
-        <pc:spChg chg="add del mod">
-          <ac:chgData name="alain desombre" userId="79cdecc42f8c13b8" providerId="LiveId" clId="{E9C843FC-B124-4061-8C89-EE7FD8F3C8A3}" dt="2020-05-01T13:41:07.277" v="86" actId="21"/>
-          <ac:spMkLst>
-            <pc:docMk/>
-            <pc:sldMk cId="299401932" sldId="273"/>
-            <ac:spMk id="5" creationId="{AC828064-EDC4-4813-A205-F9F7C347F99A}"/>
-          </ac:spMkLst>
-        </pc:spChg>
-        <pc:spChg chg="add del mod">
-          <ac:chgData name="alain desombre" userId="79cdecc42f8c13b8" providerId="LiveId" clId="{E9C843FC-B124-4061-8C89-EE7FD8F3C8A3}" dt="2020-05-01T13:41:26.730" v="88" actId="21"/>
-          <ac:spMkLst>
-            <pc:docMk/>
-            <pc:sldMk cId="299401932" sldId="273"/>
-            <ac:spMk id="7" creationId="{FC717894-EC41-47E8-A786-2C75CDCD7CA8}"/>
-          </ac:spMkLst>
-        </pc:spChg>
-        <pc:spChg chg="add mod">
-          <ac:chgData name="alain desombre" userId="79cdecc42f8c13b8" providerId="LiveId" clId="{E9C843FC-B124-4061-8C89-EE7FD8F3C8A3}" dt="2020-05-01T14:01:32.581" v="313" actId="1076"/>
-          <ac:spMkLst>
-            <pc:docMk/>
-            <pc:sldMk cId="299401932" sldId="273"/>
-            <ac:spMk id="9" creationId="{9B106050-2A1A-48C6-82A6-0213372CAAE1}"/>
-          </ac:spMkLst>
-        </pc:spChg>
-        <pc:spChg chg="add mod">
-          <ac:chgData name="alain desombre" userId="79cdecc42f8c13b8" providerId="LiveId" clId="{E9C843FC-B124-4061-8C89-EE7FD8F3C8A3}" dt="2020-05-01T13:45:55.146" v="145" actId="20577"/>
-          <ac:spMkLst>
-            <pc:docMk/>
-            <pc:sldMk cId="299401932" sldId="273"/>
-            <ac:spMk id="15" creationId="{DDD91E6B-9161-4779-94F7-687C778FAC13}"/>
-          </ac:spMkLst>
-        </pc:spChg>
-      </pc:sldChg>
-      <pc:sldChg chg="new del">
-        <pc:chgData name="alain desombre" userId="79cdecc42f8c13b8" providerId="LiveId" clId="{E9C843FC-B124-4061-8C89-EE7FD8F3C8A3}" dt="2020-05-01T13:39:45.659" v="80" actId="47"/>
-        <pc:sldMkLst>
-          <pc:docMk/>
-          <pc:sldMk cId="970273458" sldId="273"/>
-        </pc:sldMkLst>
-      </pc:sldChg>
-      <pc:sldChg chg="modSp add">
-        <pc:chgData name="alain desombre" userId="79cdecc42f8c13b8" providerId="LiveId" clId="{E9C843FC-B124-4061-8C89-EE7FD8F3C8A3}" dt="2020-05-01T13:59:41.177" v="260" actId="20577"/>
-        <pc:sldMkLst>
-          <pc:docMk/>
-          <pc:sldMk cId="1361226019" sldId="274"/>
-        </pc:sldMkLst>
-        <pc:spChg chg="mod">
-          <ac:chgData name="alain desombre" userId="79cdecc42f8c13b8" providerId="LiveId" clId="{E9C843FC-B124-4061-8C89-EE7FD8F3C8A3}" dt="2020-05-01T13:57:14.521" v="223" actId="14100"/>
-          <ac:spMkLst>
-            <pc:docMk/>
-            <pc:sldMk cId="1361226019" sldId="274"/>
-            <ac:spMk id="2" creationId="{8C92AAEA-89C1-403B-B2E2-2FB9534FE3CE}"/>
-          </ac:spMkLst>
-        </pc:spChg>
-        <pc:spChg chg="mod">
-          <ac:chgData name="alain desombre" userId="79cdecc42f8c13b8" providerId="LiveId" clId="{E9C843FC-B124-4061-8C89-EE7FD8F3C8A3}" dt="2020-05-01T13:59:41.177" v="260" actId="20577"/>
-          <ac:spMkLst>
-            <pc:docMk/>
-            <pc:sldMk cId="1361226019" sldId="274"/>
-            <ac:spMk id="3" creationId="{F03A26FC-CFD0-4E6A-916B-BAB88C1B912A}"/>
-          </ac:spMkLst>
-        </pc:spChg>
-      </pc:sldChg>
-      <pc:sldChg chg="addSp delSp modSp add">
-        <pc:chgData name="alain desombre" userId="79cdecc42f8c13b8" providerId="LiveId" clId="{E9C843FC-B124-4061-8C89-EE7FD8F3C8A3}" dt="2020-05-01T14:07:31.749" v="352" actId="20577"/>
+        <pc:chgData name="alain desombre" userId="79cdecc42f8c13b8" providerId="Windows Live" clId="Web-{9EC82C7A-1810-4786-B704-C78971D90367}" dt="2020-05-03T13:45:34.120" v="6" actId="20577"/>
         <pc:sldMkLst>
           <pc:docMk/>
           <pc:sldMk cId="1004045936" sldId="275"/>
         </pc:sldMkLst>
-        <pc:spChg chg="del mod">
-          <ac:chgData name="alain desombre" userId="79cdecc42f8c13b8" providerId="LiveId" clId="{E9C843FC-B124-4061-8C89-EE7FD8F3C8A3}" dt="2020-05-01T14:04:58.276" v="316" actId="21"/>
+        <pc:spChg chg="mod">
+          <ac:chgData name="alain desombre" userId="79cdecc42f8c13b8" providerId="Windows Live" clId="Web-{9EC82C7A-1810-4786-B704-C78971D90367}" dt="2020-05-03T13:45:34.120" v="6" actId="20577"/>
           <ac:spMkLst>
             <pc:docMk/>
             <pc:sldMk cId="1004045936" sldId="275"/>
-            <ac:spMk id="2" creationId="{8C92AAEA-89C1-403B-B2E2-2FB9534FE3CE}"/>
-          </ac:spMkLst>
-        </pc:spChg>
-        <pc:spChg chg="del">
-          <ac:chgData name="alain desombre" userId="79cdecc42f8c13b8" providerId="LiveId" clId="{E9C843FC-B124-4061-8C89-EE7FD8F3C8A3}" dt="2020-05-01T14:05:15.059" v="317" actId="21"/>
-          <ac:spMkLst>
-            <pc:docMk/>
-            <pc:sldMk cId="1004045936" sldId="275"/>
-            <ac:spMk id="3" creationId="{F03A26FC-CFD0-4E6A-916B-BAB88C1B912A}"/>
-          </ac:spMkLst>
-        </pc:spChg>
-        <pc:spChg chg="add mod">
-          <ac:chgData name="alain desombre" userId="79cdecc42f8c13b8" providerId="LiveId" clId="{E9C843FC-B124-4061-8C89-EE7FD8F3C8A3}" dt="2020-05-01T14:07:31.749" v="352" actId="20577"/>
-          <ac:spMkLst>
-            <pc:docMk/>
-            <pc:sldMk cId="1004045936" sldId="275"/>
-            <ac:spMk id="5" creationId="{26BF59BB-63C4-4052-9D20-259EEA6FB44F}"/>
-          </ac:spMkLst>
-        </pc:spChg>
-        <pc:spChg chg="add mod">
-          <ac:chgData name="alain desombre" userId="79cdecc42f8c13b8" providerId="LiveId" clId="{E9C843FC-B124-4061-8C89-EE7FD8F3C8A3}" dt="2020-05-01T14:05:55.484" v="325" actId="14100"/>
-          <ac:spMkLst>
-            <pc:docMk/>
-            <pc:sldMk cId="1004045936" sldId="275"/>
-            <ac:spMk id="7" creationId="{9785E89A-3A1A-4FA0-8E59-F8EB50D9330A}"/>
+            <ac:spMk id="2" creationId="{9D69D1C0-2BCA-4B2A-9781-54DCD0D46F1D}"/>
           </ac:spMkLst>
         </pc:spChg>
       </pc:sldChg>
     </pc:docChg>
   </pc:docChgLst>
   <pc:docChgLst>
-    <pc:chgData name="alain desombre" userId="79cdecc42f8c13b8" providerId="Windows Live" clId="Web-{84B80816-FBFE-46CC-829B-7A96CA802701}"/>
+    <pc:chgData name="alain desombre" userId="79cdecc42f8c13b8" providerId="Windows Live" clId="Web-{07C2CDCF-8E69-482D-8415-D1D714FE29A3}"/>
     <pc:docChg chg="modSld">
-      <pc:chgData name="alain desombre" userId="79cdecc42f8c13b8" providerId="Windows Live" clId="Web-{84B80816-FBFE-46CC-829B-7A96CA802701}" dt="2020-05-02T09:49:27.094" v="76" actId="20577"/>
+      <pc:chgData name="alain desombre" userId="79cdecc42f8c13b8" providerId="Windows Live" clId="Web-{07C2CDCF-8E69-482D-8415-D1D714FE29A3}" dt="2020-04-29T14:33:51.385" v="22" actId="1076"/>
       <pc:docMkLst>
         <pc:docMk/>
       </pc:docMkLst>
       <pc:sldChg chg="modSp">
-        <pc:chgData name="alain desombre" userId="79cdecc42f8c13b8" providerId="Windows Live" clId="Web-{84B80816-FBFE-46CC-829B-7A96CA802701}" dt="2020-05-02T09:48:46.905" v="74" actId="20577"/>
+        <pc:chgData name="alain desombre" userId="79cdecc42f8c13b8" providerId="Windows Live" clId="Web-{07C2CDCF-8E69-482D-8415-D1D714FE29A3}" dt="2020-04-29T14:32:33.761" v="12" actId="20577"/>
         <pc:sldMkLst>
           <pc:docMk/>
-          <pc:sldMk cId="3870336645" sldId="257"/>
+          <pc:sldMk cId="2826607830" sldId="262"/>
         </pc:sldMkLst>
         <pc:spChg chg="mod">
-          <ac:chgData name="alain desombre" userId="79cdecc42f8c13b8" providerId="Windows Live" clId="Web-{84B80816-FBFE-46CC-829B-7A96CA802701}" dt="2020-05-02T09:48:46.905" v="74" actId="20577"/>
+          <ac:chgData name="alain desombre" userId="79cdecc42f8c13b8" providerId="Windows Live" clId="Web-{07C2CDCF-8E69-482D-8415-D1D714FE29A3}" dt="2020-04-29T14:32:33.761" v="12" actId="20577"/>
           <ac:spMkLst>
             <pc:docMk/>
-            <pc:sldMk cId="3870336645" sldId="257"/>
-            <ac:spMk id="5" creationId="{2C7E6AEB-2467-4509-A906-685B370C37A2}"/>
+            <pc:sldMk cId="2826607830" sldId="262"/>
+            <ac:spMk id="6" creationId="{CF3BEA61-58D5-4058-97A7-D81BE3448735}"/>
           </ac:spMkLst>
         </pc:spChg>
       </pc:sldChg>
-    </pc:docChg>
-  </pc:docChgLst>
-  <pc:docChgLst>
-    <pc:chgData name="alain desombre" userId="79cdecc42f8c13b8" providerId="Windows Live" clId="Web-{BF4C9F29-C06B-4AF1-BAEC-F39CB3D7E365}"/>
-    <pc:docChg chg="modSld">
-      <pc:chgData name="alain desombre" userId="79cdecc42f8c13b8" providerId="Windows Live" clId="Web-{BF4C9F29-C06B-4AF1-BAEC-F39CB3D7E365}" dt="2020-04-29T13:45:02.699" v="2"/>
-      <pc:docMkLst>
-        <pc:docMk/>
-      </pc:docMkLst>
-      <pc:sldChg chg="addSp delSp modSp">
-        <pc:chgData name="alain desombre" userId="79cdecc42f8c13b8" providerId="Windows Live" clId="Web-{BF4C9F29-C06B-4AF1-BAEC-F39CB3D7E365}" dt="2020-04-29T13:45:02.699" v="2"/>
+      <pc:sldChg chg="modSp">
+        <pc:chgData name="alain desombre" userId="79cdecc42f8c13b8" providerId="Windows Live" clId="Web-{07C2CDCF-8E69-482D-8415-D1D714FE29A3}" dt="2020-04-29T14:32:48.136" v="20" actId="20577"/>
         <pc:sldMkLst>
           <pc:docMk/>
-          <pc:sldMk cId="314404111" sldId="267"/>
+          <pc:sldMk cId="3131725471" sldId="263"/>
         </pc:sldMkLst>
-        <pc:spChg chg="del">
-          <ac:chgData name="alain desombre" userId="79cdecc42f8c13b8" providerId="Windows Live" clId="Web-{BF4C9F29-C06B-4AF1-BAEC-F39CB3D7E365}" dt="2020-04-29T13:44:50.370" v="0"/>
+        <pc:spChg chg="mod">
+          <ac:chgData name="alain desombre" userId="79cdecc42f8c13b8" providerId="Windows Live" clId="Web-{07C2CDCF-8E69-482D-8415-D1D714FE29A3}" dt="2020-04-29T14:32:48.136" v="20" actId="20577"/>
           <ac:spMkLst>
             <pc:docMk/>
-            <pc:sldMk cId="314404111" sldId="267"/>
-            <ac:spMk id="3" creationId="{4060353C-BA9B-4E86-BC68-0651C8557D27}"/>
+            <pc:sldMk cId="3131725471" sldId="263"/>
+            <ac:spMk id="9" creationId="{9FA4B309-846F-4687-9507-95753C86DE84}"/>
           </ac:spMkLst>
         </pc:spChg>
-        <pc:spChg chg="add mod">
-          <ac:chgData name="alain desombre" userId="79cdecc42f8c13b8" providerId="Windows Live" clId="Web-{BF4C9F29-C06B-4AF1-BAEC-F39CB3D7E365}" dt="2020-04-29T13:45:02.699" v="2"/>
-          <ac:spMkLst>
-            <pc:docMk/>
-            <pc:sldMk cId="314404111" sldId="267"/>
-            <ac:spMk id="6" creationId="{001D15C2-3E77-4173-B3A1-9B94A19EB8C4}"/>
-          </ac:spMkLst>
-        </pc:spChg>
-        <pc:picChg chg="add del mod ord">
-          <ac:chgData name="alain desombre" userId="79cdecc42f8c13b8" providerId="Windows Live" clId="Web-{BF4C9F29-C06B-4AF1-BAEC-F39CB3D7E365}" dt="2020-04-29T13:45:02.699" v="2"/>
+      </pc:sldChg>
+      <pc:sldChg chg="modSp">
+        <pc:chgData name="alain desombre" userId="79cdecc42f8c13b8" providerId="Windows Live" clId="Web-{07C2CDCF-8E69-482D-8415-D1D714FE29A3}" dt="2020-04-29T14:33:51.385" v="22" actId="1076"/>
+        <pc:sldMkLst>
+          <pc:docMk/>
+          <pc:sldMk cId="2228380559" sldId="266"/>
+        </pc:sldMkLst>
+        <pc:picChg chg="mod">
+          <ac:chgData name="alain desombre" userId="79cdecc42f8c13b8" providerId="Windows Live" clId="Web-{07C2CDCF-8E69-482D-8415-D1D714FE29A3}" dt="2020-04-29T14:33:51.385" v="22" actId="1076"/>
           <ac:picMkLst>
             <pc:docMk/>
-            <pc:sldMk cId="314404111" sldId="267"/>
-            <ac:picMk id="2" creationId="{FC562FA6-BD02-405E-94C0-A851D3BF2D88}"/>
+            <pc:sldMk cId="2228380559" sldId="266"/>
+            <ac:picMk id="9" creationId="{1DFF6F21-369B-4CC5-84EA-2E47DD0823A0}"/>
           </ac:picMkLst>
         </pc:picChg>
       </pc:sldChg>
@@ -655,60 +527,6 @@
             <ac:spMk id="2" creationId="{9D69D1C0-2BCA-4B2A-9781-54DCD0D46F1D}"/>
           </ac:spMkLst>
         </pc:spChg>
-      </pc:sldChg>
-    </pc:docChg>
-  </pc:docChgLst>
-  <pc:docChgLst>
-    <pc:chgData name="alain desombre" userId="79cdecc42f8c13b8" providerId="Windows Live" clId="Web-{07C2CDCF-8E69-482D-8415-D1D714FE29A3}"/>
-    <pc:docChg chg="modSld">
-      <pc:chgData name="alain desombre" userId="79cdecc42f8c13b8" providerId="Windows Live" clId="Web-{07C2CDCF-8E69-482D-8415-D1D714FE29A3}" dt="2020-04-29T14:33:51.385" v="22" actId="1076"/>
-      <pc:docMkLst>
-        <pc:docMk/>
-      </pc:docMkLst>
-      <pc:sldChg chg="modSp">
-        <pc:chgData name="alain desombre" userId="79cdecc42f8c13b8" providerId="Windows Live" clId="Web-{07C2CDCF-8E69-482D-8415-D1D714FE29A3}" dt="2020-04-29T14:32:33.761" v="12" actId="20577"/>
-        <pc:sldMkLst>
-          <pc:docMk/>
-          <pc:sldMk cId="2826607830" sldId="262"/>
-        </pc:sldMkLst>
-        <pc:spChg chg="mod">
-          <ac:chgData name="alain desombre" userId="79cdecc42f8c13b8" providerId="Windows Live" clId="Web-{07C2CDCF-8E69-482D-8415-D1D714FE29A3}" dt="2020-04-29T14:32:33.761" v="12" actId="20577"/>
-          <ac:spMkLst>
-            <pc:docMk/>
-            <pc:sldMk cId="2826607830" sldId="262"/>
-            <ac:spMk id="6" creationId="{CF3BEA61-58D5-4058-97A7-D81BE3448735}"/>
-          </ac:spMkLst>
-        </pc:spChg>
-      </pc:sldChg>
-      <pc:sldChg chg="modSp">
-        <pc:chgData name="alain desombre" userId="79cdecc42f8c13b8" providerId="Windows Live" clId="Web-{07C2CDCF-8E69-482D-8415-D1D714FE29A3}" dt="2020-04-29T14:32:48.136" v="20" actId="20577"/>
-        <pc:sldMkLst>
-          <pc:docMk/>
-          <pc:sldMk cId="3131725471" sldId="263"/>
-        </pc:sldMkLst>
-        <pc:spChg chg="mod">
-          <ac:chgData name="alain desombre" userId="79cdecc42f8c13b8" providerId="Windows Live" clId="Web-{07C2CDCF-8E69-482D-8415-D1D714FE29A3}" dt="2020-04-29T14:32:48.136" v="20" actId="20577"/>
-          <ac:spMkLst>
-            <pc:docMk/>
-            <pc:sldMk cId="3131725471" sldId="263"/>
-            <ac:spMk id="9" creationId="{9FA4B309-846F-4687-9507-95753C86DE84}"/>
-          </ac:spMkLst>
-        </pc:spChg>
-      </pc:sldChg>
-      <pc:sldChg chg="modSp">
-        <pc:chgData name="alain desombre" userId="79cdecc42f8c13b8" providerId="Windows Live" clId="Web-{07C2CDCF-8E69-482D-8415-D1D714FE29A3}" dt="2020-04-29T14:33:51.385" v="22" actId="1076"/>
-        <pc:sldMkLst>
-          <pc:docMk/>
-          <pc:sldMk cId="2228380559" sldId="266"/>
-        </pc:sldMkLst>
-        <pc:picChg chg="mod">
-          <ac:chgData name="alain desombre" userId="79cdecc42f8c13b8" providerId="Windows Live" clId="Web-{07C2CDCF-8E69-482D-8415-D1D714FE29A3}" dt="2020-04-29T14:33:51.385" v="22" actId="1076"/>
-          <ac:picMkLst>
-            <pc:docMk/>
-            <pc:sldMk cId="2228380559" sldId="266"/>
-            <ac:picMk id="9" creationId="{1DFF6F21-369B-4CC5-84EA-2E47DD0823A0}"/>
-          </ac:picMkLst>
-        </pc:picChg>
       </pc:sldChg>
     </pc:docChg>
   </pc:docChgLst>
@@ -1388,6 +1206,169 @@
     </pc:docChg>
   </pc:docChgLst>
   <pc:docChgLst>
+    <pc:chgData name="alain desombre" userId="79cdecc42f8c13b8" providerId="Windows Live" clId="Web-{12E29DCC-931E-4B11-8C95-297D30E1E01A}"/>
+    <pc:docChg chg="modSld">
+      <pc:chgData name="alain desombre" userId="79cdecc42f8c13b8" providerId="Windows Live" clId="Web-{12E29DCC-931E-4B11-8C95-297D30E1E01A}" dt="2020-05-03T13:43:19.265" v="101" actId="20577"/>
+      <pc:docMkLst>
+        <pc:docMk/>
+      </pc:docMkLst>
+      <pc:sldChg chg="modSp">
+        <pc:chgData name="alain desombre" userId="79cdecc42f8c13b8" providerId="Windows Live" clId="Web-{12E29DCC-931E-4B11-8C95-297D30E1E01A}" dt="2020-05-03T13:41:48.074" v="76" actId="20577"/>
+        <pc:sldMkLst>
+          <pc:docMk/>
+          <pc:sldMk cId="2836824980" sldId="264"/>
+        </pc:sldMkLst>
+        <pc:spChg chg="mod">
+          <ac:chgData name="alain desombre" userId="79cdecc42f8c13b8" providerId="Windows Live" clId="Web-{12E29DCC-931E-4B11-8C95-297D30E1E01A}" dt="2020-05-03T13:41:48.074" v="76" actId="20577"/>
+          <ac:spMkLst>
+            <pc:docMk/>
+            <pc:sldMk cId="2836824980" sldId="264"/>
+            <ac:spMk id="6" creationId="{78E802D7-10C1-4D48-9C16-6485CE61BF2A}"/>
+          </ac:spMkLst>
+        </pc:spChg>
+      </pc:sldChg>
+      <pc:sldChg chg="modSp">
+        <pc:chgData name="alain desombre" userId="79cdecc42f8c13b8" providerId="Windows Live" clId="Web-{12E29DCC-931E-4B11-8C95-297D30E1E01A}" dt="2020-05-03T13:42:02.434" v="80" actId="20577"/>
+        <pc:sldMkLst>
+          <pc:docMk/>
+          <pc:sldMk cId="2146253586" sldId="265"/>
+        </pc:sldMkLst>
+        <pc:spChg chg="mod">
+          <ac:chgData name="alain desombre" userId="79cdecc42f8c13b8" providerId="Windows Live" clId="Web-{12E29DCC-931E-4B11-8C95-297D30E1E01A}" dt="2020-05-03T13:42:02.434" v="80" actId="20577"/>
+          <ac:spMkLst>
+            <pc:docMk/>
+            <pc:sldMk cId="2146253586" sldId="265"/>
+            <ac:spMk id="6" creationId="{A9D25835-23ED-4184-8BA9-45F114B5803C}"/>
+          </ac:spMkLst>
+        </pc:spChg>
+      </pc:sldChg>
+      <pc:sldChg chg="modSp">
+        <pc:chgData name="alain desombre" userId="79cdecc42f8c13b8" providerId="Windows Live" clId="Web-{12E29DCC-931E-4B11-8C95-297D30E1E01A}" dt="2020-05-03T13:42:43.513" v="94" actId="20577"/>
+        <pc:sldMkLst>
+          <pc:docMk/>
+          <pc:sldMk cId="3048587470" sldId="268"/>
+        </pc:sldMkLst>
+        <pc:spChg chg="mod">
+          <ac:chgData name="alain desombre" userId="79cdecc42f8c13b8" providerId="Windows Live" clId="Web-{12E29DCC-931E-4B11-8C95-297D30E1E01A}" dt="2020-05-03T13:42:43.513" v="94" actId="20577"/>
+          <ac:spMkLst>
+            <pc:docMk/>
+            <pc:sldMk cId="3048587470" sldId="268"/>
+            <ac:spMk id="2" creationId="{712AD056-EC7C-4D1F-9D7E-D741D0FEE935}"/>
+          </ac:spMkLst>
+        </pc:spChg>
+      </pc:sldChg>
+      <pc:sldChg chg="modSp">
+        <pc:chgData name="alain desombre" userId="79cdecc42f8c13b8" providerId="Windows Live" clId="Web-{12E29DCC-931E-4B11-8C95-297D30E1E01A}" dt="2020-05-03T13:43:19.265" v="100" actId="20577"/>
+        <pc:sldMkLst>
+          <pc:docMk/>
+          <pc:sldMk cId="4179780907" sldId="271"/>
+        </pc:sldMkLst>
+        <pc:spChg chg="mod">
+          <ac:chgData name="alain desombre" userId="79cdecc42f8c13b8" providerId="Windows Live" clId="Web-{12E29DCC-931E-4B11-8C95-297D30E1E01A}" dt="2020-05-03T13:43:19.265" v="100" actId="20577"/>
+          <ac:spMkLst>
+            <pc:docMk/>
+            <pc:sldMk cId="4179780907" sldId="271"/>
+            <ac:spMk id="2" creationId="{9A5ECF87-F1B0-48E0-801E-0A7FDA3B7418}"/>
+          </ac:spMkLst>
+        </pc:spChg>
+      </pc:sldChg>
+      <pc:sldChg chg="modSp">
+        <pc:chgData name="alain desombre" userId="79cdecc42f8c13b8" providerId="Windows Live" clId="Web-{12E29DCC-931E-4B11-8C95-297D30E1E01A}" dt="2020-05-03T13:38:43.738" v="8" actId="20577"/>
+        <pc:sldMkLst>
+          <pc:docMk/>
+          <pc:sldMk cId="299401932" sldId="273"/>
+        </pc:sldMkLst>
+        <pc:spChg chg="mod">
+          <ac:chgData name="alain desombre" userId="79cdecc42f8c13b8" providerId="Windows Live" clId="Web-{12E29DCC-931E-4B11-8C95-297D30E1E01A}" dt="2020-05-03T13:38:43.738" v="8" actId="20577"/>
+          <ac:spMkLst>
+            <pc:docMk/>
+            <pc:sldMk cId="299401932" sldId="273"/>
+            <ac:spMk id="9" creationId="{9B106050-2A1A-48C6-82A6-0213372CAAE1}"/>
+          </ac:spMkLst>
+        </pc:spChg>
+      </pc:sldChg>
+      <pc:sldChg chg="modSp">
+        <pc:chgData name="alain desombre" userId="79cdecc42f8c13b8" providerId="Windows Live" clId="Web-{12E29DCC-931E-4B11-8C95-297D30E1E01A}" dt="2020-05-03T13:41:13.494" v="71" actId="14100"/>
+        <pc:sldMkLst>
+          <pc:docMk/>
+          <pc:sldMk cId="1004045936" sldId="275"/>
+        </pc:sldMkLst>
+        <pc:spChg chg="mod">
+          <ac:chgData name="alain desombre" userId="79cdecc42f8c13b8" providerId="Windows Live" clId="Web-{12E29DCC-931E-4B11-8C95-297D30E1E01A}" dt="2020-05-03T13:41:13.494" v="71" actId="14100"/>
+          <ac:spMkLst>
+            <pc:docMk/>
+            <pc:sldMk cId="1004045936" sldId="275"/>
+            <ac:spMk id="2" creationId="{9D69D1C0-2BCA-4B2A-9781-54DCD0D46F1D}"/>
+          </ac:spMkLst>
+        </pc:spChg>
+      </pc:sldChg>
+    </pc:docChg>
+  </pc:docChgLst>
+  <pc:docChgLst>
+    <pc:chgData name="alain desombre" userId="79cdecc42f8c13b8" providerId="Windows Live" clId="Web-{16CC47DD-5F52-45A0-9381-E5AB63C4A301}"/>
+    <pc:docChg chg="modSld">
+      <pc:chgData name="alain desombre" userId="79cdecc42f8c13b8" providerId="Windows Live" clId="Web-{16CC47DD-5F52-45A0-9381-E5AB63C4A301}" dt="2020-04-29T13:49:25.136" v="1"/>
+      <pc:docMkLst>
+        <pc:docMk/>
+      </pc:docMkLst>
+      <pc:sldChg chg="addSp delSp">
+        <pc:chgData name="alain desombre" userId="79cdecc42f8c13b8" providerId="Windows Live" clId="Web-{16CC47DD-5F52-45A0-9381-E5AB63C4A301}" dt="2020-04-29T13:49:25.136" v="1"/>
+        <pc:sldMkLst>
+          <pc:docMk/>
+          <pc:sldMk cId="314404111" sldId="267"/>
+        </pc:sldMkLst>
+        <pc:spChg chg="add del">
+          <ac:chgData name="alain desombre" userId="79cdecc42f8c13b8" providerId="Windows Live" clId="Web-{16CC47DD-5F52-45A0-9381-E5AB63C4A301}" dt="2020-04-29T13:49:25.136" v="1"/>
+          <ac:spMkLst>
+            <pc:docMk/>
+            <pc:sldMk cId="314404111" sldId="267"/>
+            <ac:spMk id="2" creationId="{B1E71ECC-7304-4463-AFD5-CAE3B9808377}"/>
+          </ac:spMkLst>
+        </pc:spChg>
+      </pc:sldChg>
+    </pc:docChg>
+  </pc:docChgLst>
+  <pc:docChgLst>
+    <pc:chgData name="alain desombre" userId="79cdecc42f8c13b8" providerId="Windows Live" clId="Web-{BF4C9F29-C06B-4AF1-BAEC-F39CB3D7E365}"/>
+    <pc:docChg chg="modSld">
+      <pc:chgData name="alain desombre" userId="79cdecc42f8c13b8" providerId="Windows Live" clId="Web-{BF4C9F29-C06B-4AF1-BAEC-F39CB3D7E365}" dt="2020-04-29T13:45:02.699" v="2"/>
+      <pc:docMkLst>
+        <pc:docMk/>
+      </pc:docMkLst>
+      <pc:sldChg chg="addSp delSp modSp">
+        <pc:chgData name="alain desombre" userId="79cdecc42f8c13b8" providerId="Windows Live" clId="Web-{BF4C9F29-C06B-4AF1-BAEC-F39CB3D7E365}" dt="2020-04-29T13:45:02.699" v="2"/>
+        <pc:sldMkLst>
+          <pc:docMk/>
+          <pc:sldMk cId="314404111" sldId="267"/>
+        </pc:sldMkLst>
+        <pc:spChg chg="del">
+          <ac:chgData name="alain desombre" userId="79cdecc42f8c13b8" providerId="Windows Live" clId="Web-{BF4C9F29-C06B-4AF1-BAEC-F39CB3D7E365}" dt="2020-04-29T13:44:50.370" v="0"/>
+          <ac:spMkLst>
+            <pc:docMk/>
+            <pc:sldMk cId="314404111" sldId="267"/>
+            <ac:spMk id="3" creationId="{4060353C-BA9B-4E86-BC68-0651C8557D27}"/>
+          </ac:spMkLst>
+        </pc:spChg>
+        <pc:spChg chg="add mod">
+          <ac:chgData name="alain desombre" userId="79cdecc42f8c13b8" providerId="Windows Live" clId="Web-{BF4C9F29-C06B-4AF1-BAEC-F39CB3D7E365}" dt="2020-04-29T13:45:02.699" v="2"/>
+          <ac:spMkLst>
+            <pc:docMk/>
+            <pc:sldMk cId="314404111" sldId="267"/>
+            <ac:spMk id="6" creationId="{001D15C2-3E77-4173-B3A1-9B94A19EB8C4}"/>
+          </ac:spMkLst>
+        </pc:spChg>
+        <pc:picChg chg="add del mod ord">
+          <ac:chgData name="alain desombre" userId="79cdecc42f8c13b8" providerId="Windows Live" clId="Web-{BF4C9F29-C06B-4AF1-BAEC-F39CB3D7E365}" dt="2020-04-29T13:45:02.699" v="2"/>
+          <ac:picMkLst>
+            <pc:docMk/>
+            <pc:sldMk cId="314404111" sldId="267"/>
+            <ac:picMk id="2" creationId="{FC562FA6-BD02-405E-94C0-A851D3BF2D88}"/>
+          </ac:picMkLst>
+        </pc:picChg>
+      </pc:sldChg>
+    </pc:docChg>
+  </pc:docChgLst>
+  <pc:docChgLst>
     <pc:chgData name="alain desombre" userId="79cdecc42f8c13b8" providerId="Windows Live" clId="Web-{4439087D-58C0-4318-950B-96C8EC222E8A}"/>
     <pc:docChg chg="addSld delSld modSld">
       <pc:chgData name="alain desombre" userId="79cdecc42f8c13b8" providerId="Windows Live" clId="Web-{4439087D-58C0-4318-950B-96C8EC222E8A}" dt="2020-04-29T14:26:25.382" v="162" actId="20577"/>
@@ -1664,24 +1645,232 @@
     </pc:docChg>
   </pc:docChgLst>
   <pc:docChgLst>
-    <pc:chgData name="alain desombre" userId="79cdecc42f8c13b8" providerId="Windows Live" clId="Web-{16CC47DD-5F52-45A0-9381-E5AB63C4A301}"/>
-    <pc:docChg chg="modSld">
-      <pc:chgData name="alain desombre" userId="79cdecc42f8c13b8" providerId="Windows Live" clId="Web-{16CC47DD-5F52-45A0-9381-E5AB63C4A301}" dt="2020-04-29T13:49:25.136" v="1"/>
+    <pc:chgData name="alain desombre" userId="79cdecc42f8c13b8" providerId="LiveId" clId="{E9C843FC-B124-4061-8C89-EE7FD8F3C8A3}"/>
+    <pc:docChg chg="custSel addSld delSld modSld sldOrd">
+      <pc:chgData name="alain desombre" userId="79cdecc42f8c13b8" providerId="LiveId" clId="{E9C843FC-B124-4061-8C89-EE7FD8F3C8A3}" dt="2020-05-18T14:15:05.564" v="361" actId="1036"/>
       <pc:docMkLst>
         <pc:docMk/>
       </pc:docMkLst>
-      <pc:sldChg chg="addSp delSp">
-        <pc:chgData name="alain desombre" userId="79cdecc42f8c13b8" providerId="Windows Live" clId="Web-{16CC47DD-5F52-45A0-9381-E5AB63C4A301}" dt="2020-04-29T13:49:25.136" v="1"/>
+      <pc:sldChg chg="ord">
+        <pc:chgData name="alain desombre" userId="79cdecc42f8c13b8" providerId="LiveId" clId="{E9C843FC-B124-4061-8C89-EE7FD8F3C8A3}" dt="2020-05-01T13:42:37.339" v="96"/>
         <pc:sldMkLst>
           <pc:docMk/>
-          <pc:sldMk cId="314404111" sldId="267"/>
+          <pc:sldMk cId="3870336645" sldId="257"/>
         </pc:sldMkLst>
-        <pc:spChg chg="add del">
-          <ac:chgData name="alain desombre" userId="79cdecc42f8c13b8" providerId="Windows Live" clId="Web-{16CC47DD-5F52-45A0-9381-E5AB63C4A301}" dt="2020-04-29T13:49:25.136" v="1"/>
+      </pc:sldChg>
+      <pc:sldChg chg="addSp modSp">
+        <pc:chgData name="alain desombre" userId="79cdecc42f8c13b8" providerId="LiveId" clId="{E9C843FC-B124-4061-8C89-EE7FD8F3C8A3}" dt="2020-05-01T14:01:12.433" v="312" actId="20577"/>
+        <pc:sldMkLst>
+          <pc:docMk/>
+          <pc:sldMk cId="2667983443" sldId="258"/>
+        </pc:sldMkLst>
+        <pc:spChg chg="add mod">
+          <ac:chgData name="alain desombre" userId="79cdecc42f8c13b8" providerId="LiveId" clId="{E9C843FC-B124-4061-8C89-EE7FD8F3C8A3}" dt="2020-05-01T14:01:12.433" v="312" actId="20577"/>
           <ac:spMkLst>
             <pc:docMk/>
-            <pc:sldMk cId="314404111" sldId="267"/>
-            <ac:spMk id="2" creationId="{B1E71ECC-7304-4463-AFD5-CAE3B9808377}"/>
+            <pc:sldMk cId="2667983443" sldId="258"/>
+            <ac:spMk id="14" creationId="{E412B0E6-09D8-476C-82D0-194AE17351B6}"/>
+          </ac:spMkLst>
+        </pc:spChg>
+      </pc:sldChg>
+      <pc:sldChg chg="modSp mod">
+        <pc:chgData name="alain desombre" userId="79cdecc42f8c13b8" providerId="LiveId" clId="{E9C843FC-B124-4061-8C89-EE7FD8F3C8A3}" dt="2020-05-18T14:15:05.564" v="361" actId="1036"/>
+        <pc:sldMkLst>
+          <pc:docMk/>
+          <pc:sldMk cId="2228380559" sldId="266"/>
+        </pc:sldMkLst>
+        <pc:spChg chg="mod">
+          <ac:chgData name="alain desombre" userId="79cdecc42f8c13b8" providerId="LiveId" clId="{E9C843FC-B124-4061-8C89-EE7FD8F3C8A3}" dt="2020-05-18T14:15:05.564" v="361" actId="1036"/>
+          <ac:spMkLst>
+            <pc:docMk/>
+            <pc:sldMk cId="2228380559" sldId="266"/>
+            <ac:spMk id="7" creationId="{84CD875F-10E8-4D3D-A5D2-35055B8AEC77}"/>
+          </ac:spMkLst>
+        </pc:spChg>
+        <pc:picChg chg="mod">
+          <ac:chgData name="alain desombre" userId="79cdecc42f8c13b8" providerId="LiveId" clId="{E9C843FC-B124-4061-8C89-EE7FD8F3C8A3}" dt="2020-05-18T14:14:58.808" v="359" actId="1038"/>
+          <ac:picMkLst>
+            <pc:docMk/>
+            <pc:sldMk cId="2228380559" sldId="266"/>
+            <ac:picMk id="9" creationId="{1DFF6F21-369B-4CC5-84EA-2E47DD0823A0}"/>
+          </ac:picMkLst>
+        </pc:picChg>
+      </pc:sldChg>
+      <pc:sldChg chg="modSp">
+        <pc:chgData name="alain desombre" userId="79cdecc42f8c13b8" providerId="LiveId" clId="{E9C843FC-B124-4061-8C89-EE7FD8F3C8A3}" dt="2020-04-29T16:35:54.631" v="78" actId="313"/>
+        <pc:sldMkLst>
+          <pc:docMk/>
+          <pc:sldMk cId="3048587470" sldId="268"/>
+        </pc:sldMkLst>
+        <pc:spChg chg="mod">
+          <ac:chgData name="alain desombre" userId="79cdecc42f8c13b8" providerId="LiveId" clId="{E9C843FC-B124-4061-8C89-EE7FD8F3C8A3}" dt="2020-04-29T16:35:54.631" v="78" actId="313"/>
+          <ac:spMkLst>
+            <pc:docMk/>
+            <pc:sldMk cId="3048587470" sldId="268"/>
+            <ac:spMk id="2" creationId="{712AD056-EC7C-4D1F-9D7E-D741D0FEE935}"/>
+          </ac:spMkLst>
+        </pc:spChg>
+      </pc:sldChg>
+      <pc:sldChg chg="modSp">
+        <pc:chgData name="alain desombre" userId="79cdecc42f8c13b8" providerId="LiveId" clId="{E9C843FC-B124-4061-8C89-EE7FD8F3C8A3}" dt="2020-04-29T16:35:07.805" v="76" actId="20577"/>
+        <pc:sldMkLst>
+          <pc:docMk/>
+          <pc:sldMk cId="1150103603" sldId="270"/>
+        </pc:sldMkLst>
+        <pc:spChg chg="mod">
+          <ac:chgData name="alain desombre" userId="79cdecc42f8c13b8" providerId="LiveId" clId="{E9C843FC-B124-4061-8C89-EE7FD8F3C8A3}" dt="2020-04-29T16:35:07.805" v="76" actId="20577"/>
+          <ac:spMkLst>
+            <pc:docMk/>
+            <pc:sldMk cId="1150103603" sldId="270"/>
+            <ac:spMk id="4" creationId="{23FF0368-5B71-4346-8EC9-170C0817FCC0}"/>
+          </ac:spMkLst>
+        </pc:spChg>
+      </pc:sldChg>
+      <pc:sldChg chg="addSp delSp modSp add">
+        <pc:chgData name="alain desombre" userId="79cdecc42f8c13b8" providerId="LiveId" clId="{E9C843FC-B124-4061-8C89-EE7FD8F3C8A3}" dt="2020-05-01T14:01:32.581" v="313" actId="1076"/>
+        <pc:sldMkLst>
+          <pc:docMk/>
+          <pc:sldMk cId="299401932" sldId="273"/>
+        </pc:sldMkLst>
+        <pc:spChg chg="del mod">
+          <ac:chgData name="alain desombre" userId="79cdecc42f8c13b8" providerId="LiveId" clId="{E9C843FC-B124-4061-8C89-EE7FD8F3C8A3}" dt="2020-05-01T13:40:30.778" v="84" actId="21"/>
+          <ac:spMkLst>
+            <pc:docMk/>
+            <pc:sldMk cId="299401932" sldId="273"/>
+            <ac:spMk id="2" creationId="{8C92AAEA-89C1-403B-B2E2-2FB9534FE3CE}"/>
+          </ac:spMkLst>
+        </pc:spChg>
+        <pc:spChg chg="del mod">
+          <ac:chgData name="alain desombre" userId="79cdecc42f8c13b8" providerId="LiveId" clId="{E9C843FC-B124-4061-8C89-EE7FD8F3C8A3}" dt="2020-05-01T13:41:13.234" v="87" actId="21"/>
+          <ac:spMkLst>
+            <pc:docMk/>
+            <pc:sldMk cId="299401932" sldId="273"/>
+            <ac:spMk id="3" creationId="{F03A26FC-CFD0-4E6A-916B-BAB88C1B912A}"/>
+          </ac:spMkLst>
+        </pc:spChg>
+        <pc:spChg chg="add del mod">
+          <ac:chgData name="alain desombre" userId="79cdecc42f8c13b8" providerId="LiveId" clId="{E9C843FC-B124-4061-8C89-EE7FD8F3C8A3}" dt="2020-05-01T13:41:07.277" v="86" actId="21"/>
+          <ac:spMkLst>
+            <pc:docMk/>
+            <pc:sldMk cId="299401932" sldId="273"/>
+            <ac:spMk id="5" creationId="{AC828064-EDC4-4813-A205-F9F7C347F99A}"/>
+          </ac:spMkLst>
+        </pc:spChg>
+        <pc:spChg chg="add del mod">
+          <ac:chgData name="alain desombre" userId="79cdecc42f8c13b8" providerId="LiveId" clId="{E9C843FC-B124-4061-8C89-EE7FD8F3C8A3}" dt="2020-05-01T13:41:26.730" v="88" actId="21"/>
+          <ac:spMkLst>
+            <pc:docMk/>
+            <pc:sldMk cId="299401932" sldId="273"/>
+            <ac:spMk id="7" creationId="{FC717894-EC41-47E8-A786-2C75CDCD7CA8}"/>
+          </ac:spMkLst>
+        </pc:spChg>
+        <pc:spChg chg="add mod">
+          <ac:chgData name="alain desombre" userId="79cdecc42f8c13b8" providerId="LiveId" clId="{E9C843FC-B124-4061-8C89-EE7FD8F3C8A3}" dt="2020-05-01T14:01:32.581" v="313" actId="1076"/>
+          <ac:spMkLst>
+            <pc:docMk/>
+            <pc:sldMk cId="299401932" sldId="273"/>
+            <ac:spMk id="9" creationId="{9B106050-2A1A-48C6-82A6-0213372CAAE1}"/>
+          </ac:spMkLst>
+        </pc:spChg>
+        <pc:spChg chg="add mod">
+          <ac:chgData name="alain desombre" userId="79cdecc42f8c13b8" providerId="LiveId" clId="{E9C843FC-B124-4061-8C89-EE7FD8F3C8A3}" dt="2020-05-01T13:45:55.146" v="145" actId="20577"/>
+          <ac:spMkLst>
+            <pc:docMk/>
+            <pc:sldMk cId="299401932" sldId="273"/>
+            <ac:spMk id="15" creationId="{DDD91E6B-9161-4779-94F7-687C778FAC13}"/>
+          </ac:spMkLst>
+        </pc:spChg>
+      </pc:sldChg>
+      <pc:sldChg chg="new del">
+        <pc:chgData name="alain desombre" userId="79cdecc42f8c13b8" providerId="LiveId" clId="{E9C843FC-B124-4061-8C89-EE7FD8F3C8A3}" dt="2020-05-01T13:39:45.659" v="80" actId="47"/>
+        <pc:sldMkLst>
+          <pc:docMk/>
+          <pc:sldMk cId="970273458" sldId="273"/>
+        </pc:sldMkLst>
+      </pc:sldChg>
+      <pc:sldChg chg="modSp add">
+        <pc:chgData name="alain desombre" userId="79cdecc42f8c13b8" providerId="LiveId" clId="{E9C843FC-B124-4061-8C89-EE7FD8F3C8A3}" dt="2020-05-01T13:59:41.177" v="260" actId="20577"/>
+        <pc:sldMkLst>
+          <pc:docMk/>
+          <pc:sldMk cId="1361226019" sldId="274"/>
+        </pc:sldMkLst>
+        <pc:spChg chg="mod">
+          <ac:chgData name="alain desombre" userId="79cdecc42f8c13b8" providerId="LiveId" clId="{E9C843FC-B124-4061-8C89-EE7FD8F3C8A3}" dt="2020-05-01T13:57:14.521" v="223" actId="14100"/>
+          <ac:spMkLst>
+            <pc:docMk/>
+            <pc:sldMk cId="1361226019" sldId="274"/>
+            <ac:spMk id="2" creationId="{8C92AAEA-89C1-403B-B2E2-2FB9534FE3CE}"/>
+          </ac:spMkLst>
+        </pc:spChg>
+        <pc:spChg chg="mod">
+          <ac:chgData name="alain desombre" userId="79cdecc42f8c13b8" providerId="LiveId" clId="{E9C843FC-B124-4061-8C89-EE7FD8F3C8A3}" dt="2020-05-01T13:59:41.177" v="260" actId="20577"/>
+          <ac:spMkLst>
+            <pc:docMk/>
+            <pc:sldMk cId="1361226019" sldId="274"/>
+            <ac:spMk id="3" creationId="{F03A26FC-CFD0-4E6A-916B-BAB88C1B912A}"/>
+          </ac:spMkLst>
+        </pc:spChg>
+      </pc:sldChg>
+      <pc:sldChg chg="addSp delSp modSp add">
+        <pc:chgData name="alain desombre" userId="79cdecc42f8c13b8" providerId="LiveId" clId="{E9C843FC-B124-4061-8C89-EE7FD8F3C8A3}" dt="2020-05-01T14:07:31.749" v="352" actId="20577"/>
+        <pc:sldMkLst>
+          <pc:docMk/>
+          <pc:sldMk cId="1004045936" sldId="275"/>
+        </pc:sldMkLst>
+        <pc:spChg chg="del mod">
+          <ac:chgData name="alain desombre" userId="79cdecc42f8c13b8" providerId="LiveId" clId="{E9C843FC-B124-4061-8C89-EE7FD8F3C8A3}" dt="2020-05-01T14:04:58.276" v="316" actId="21"/>
+          <ac:spMkLst>
+            <pc:docMk/>
+            <pc:sldMk cId="1004045936" sldId="275"/>
+            <ac:spMk id="2" creationId="{8C92AAEA-89C1-403B-B2E2-2FB9534FE3CE}"/>
+          </ac:spMkLst>
+        </pc:spChg>
+        <pc:spChg chg="del">
+          <ac:chgData name="alain desombre" userId="79cdecc42f8c13b8" providerId="LiveId" clId="{E9C843FC-B124-4061-8C89-EE7FD8F3C8A3}" dt="2020-05-01T14:05:15.059" v="317" actId="21"/>
+          <ac:spMkLst>
+            <pc:docMk/>
+            <pc:sldMk cId="1004045936" sldId="275"/>
+            <ac:spMk id="3" creationId="{F03A26FC-CFD0-4E6A-916B-BAB88C1B912A}"/>
+          </ac:spMkLst>
+        </pc:spChg>
+        <pc:spChg chg="add mod">
+          <ac:chgData name="alain desombre" userId="79cdecc42f8c13b8" providerId="LiveId" clId="{E9C843FC-B124-4061-8C89-EE7FD8F3C8A3}" dt="2020-05-01T14:07:31.749" v="352" actId="20577"/>
+          <ac:spMkLst>
+            <pc:docMk/>
+            <pc:sldMk cId="1004045936" sldId="275"/>
+            <ac:spMk id="5" creationId="{26BF59BB-63C4-4052-9D20-259EEA6FB44F}"/>
+          </ac:spMkLst>
+        </pc:spChg>
+        <pc:spChg chg="add mod">
+          <ac:chgData name="alain desombre" userId="79cdecc42f8c13b8" providerId="LiveId" clId="{E9C843FC-B124-4061-8C89-EE7FD8F3C8A3}" dt="2020-05-01T14:05:55.484" v="325" actId="14100"/>
+          <ac:spMkLst>
+            <pc:docMk/>
+            <pc:sldMk cId="1004045936" sldId="275"/>
+            <ac:spMk id="7" creationId="{9785E89A-3A1A-4FA0-8E59-F8EB50D9330A}"/>
+          </ac:spMkLst>
+        </pc:spChg>
+      </pc:sldChg>
+    </pc:docChg>
+  </pc:docChgLst>
+  <pc:docChgLst>
+    <pc:chgData name="alain desombre" userId="79cdecc42f8c13b8" providerId="Windows Live" clId="Web-{84B80816-FBFE-46CC-829B-7A96CA802701}"/>
+    <pc:docChg chg="modSld">
+      <pc:chgData name="alain desombre" userId="79cdecc42f8c13b8" providerId="Windows Live" clId="Web-{84B80816-FBFE-46CC-829B-7A96CA802701}" dt="2020-05-02T09:49:27.094" v="76" actId="20577"/>
+      <pc:docMkLst>
+        <pc:docMk/>
+      </pc:docMkLst>
+      <pc:sldChg chg="modSp">
+        <pc:chgData name="alain desombre" userId="79cdecc42f8c13b8" providerId="Windows Live" clId="Web-{84B80816-FBFE-46CC-829B-7A96CA802701}" dt="2020-05-02T09:48:46.905" v="74" actId="20577"/>
+        <pc:sldMkLst>
+          <pc:docMk/>
+          <pc:sldMk cId="3870336645" sldId="257"/>
+        </pc:sldMkLst>
+        <pc:spChg chg="mod">
+          <ac:chgData name="alain desombre" userId="79cdecc42f8c13b8" providerId="Windows Live" clId="Web-{84B80816-FBFE-46CC-829B-7A96CA802701}" dt="2020-05-02T09:48:46.905" v="74" actId="20577"/>
+          <ac:spMkLst>
+            <pc:docMk/>
+            <pc:sldMk cId="3870336645" sldId="257"/>
+            <ac:spMk id="5" creationId="{2C7E6AEB-2467-4509-A906-685B370C37A2}"/>
           </ac:spMkLst>
         </pc:spChg>
       </pc:sldChg>
@@ -1691,6 +1880,70 @@
 </file>
 
 <file path=ppt/ink/ink1.xml><?xml version="1.0" encoding="utf-8"?>
+<inkml:ink xmlns:inkml="http://www.w3.org/2003/InkML">
+  <inkml:definitions>
+    <inkml:context xml:id="ctx0">
+      <inkml:inkSource xml:id="inkSrc0">
+        <inkml:traceFormat>
+          <inkml:channel name="X" type="integer" min="-2.14748E9" max="2.14748E9" units="cm"/>
+          <inkml:channel name="Y" type="integer" min="-2.14748E9" max="2.14748E9" units="cm"/>
+          <inkml:channel name="F" type="integer" max="32767" units="dev"/>
+          <inkml:channel name="OA" type="integer" max="360" units="deg"/>
+          <inkml:channel name="OE" type="integer" max="90" units="deg"/>
+        </inkml:traceFormat>
+        <inkml:channelProperties>
+          <inkml:channelProperty channel="X" name="resolution" value="1000" units="1/cm"/>
+          <inkml:channelProperty channel="Y" name="resolution" value="1000" units="1/cm"/>
+          <inkml:channelProperty channel="F" name="resolution" value="0" units="1/dev"/>
+          <inkml:channelProperty channel="OA" name="resolution" value="1000" units="1/deg"/>
+          <inkml:channelProperty channel="OE" name="resolution" value="1000" units="1/deg"/>
+        </inkml:channelProperties>
+      </inkml:inkSource>
+      <inkml:timestamp xml:id="ts0" timeString="2020-04-29T14:22:21.337"/>
+    </inkml:context>
+    <inkml:brush xml:id="br0">
+      <inkml:brushProperty name="width" value="0.1" units="cm"/>
+      <inkml:brushProperty name="height" value="0.1" units="cm"/>
+      <inkml:brushProperty name="color" value="#E71224"/>
+    </inkml:brush>
+  </inkml:definitions>
+  <inkml:trace contextRef="#ctx0" brushRef="#br0">6000 11212 11999 0 0,'-27'-27'992'0'0,"27"0"-1888"0"0,-27-27-96 0 0,0 54 416 0 0,0-26 320 0 0,1 26-672 0 0,26-27-960 0 0,-27 54 1088 0 0,0-27 384 0 0,54 0-864 0 0,-27 26 128 0 0,27-26 32 0 0,-1 0 192 0 0,1 0-32 0 0,0 27 161 0 0,0-27 799 0 0,0 0 0 0 0,-27 0 0 0 0</inkml:trace>
+</inkml:ink>
+</file>
+
+<file path=ppt/ink/ink10.xml><?xml version="1.0" encoding="utf-8"?>
+<inkml:ink xmlns:inkml="http://www.w3.org/2003/InkML">
+  <inkml:definitions>
+    <inkml:context xml:id="ctx0">
+      <inkml:inkSource xml:id="inkSrc0">
+        <inkml:traceFormat>
+          <inkml:channel name="X" type="integer" min="-2.14748E9" max="2.14748E9" units="cm"/>
+          <inkml:channel name="Y" type="integer" min="-2.14748E9" max="2.14748E9" units="cm"/>
+          <inkml:channel name="F" type="integer" max="32767" units="dev"/>
+          <inkml:channel name="OA" type="integer" max="360" units="deg"/>
+          <inkml:channel name="OE" type="integer" max="90" units="deg"/>
+        </inkml:traceFormat>
+        <inkml:channelProperties>
+          <inkml:channelProperty channel="X" name="resolution" value="1000" units="1/cm"/>
+          <inkml:channelProperty channel="Y" name="resolution" value="1000" units="1/cm"/>
+          <inkml:channelProperty channel="F" name="resolution" value="0" units="1/dev"/>
+          <inkml:channelProperty channel="OA" name="resolution" value="1000" units="1/deg"/>
+          <inkml:channelProperty channel="OE" name="resolution" value="1000" units="1/deg"/>
+        </inkml:channelProperties>
+      </inkml:inkSource>
+      <inkml:timestamp xml:id="ts0" timeString="2020-04-29T14:22:21.337"/>
+    </inkml:context>
+    <inkml:brush xml:id="br0">
+      <inkml:brushProperty name="width" value="0.1" units="cm"/>
+      <inkml:brushProperty name="height" value="0.1" units="cm"/>
+      <inkml:brushProperty name="color" value="#E71224"/>
+    </inkml:brush>
+  </inkml:definitions>
+  <inkml:trace contextRef="#ctx0" brushRef="#br0">6000 11212 11999 0 0,'-27'-27'992'0'0,"27"0"-1888"0"0,-27-27-96 0 0,0 54 416 0 0,0-26 320 0 0,1 26-672 0 0,26-27-960 0 0,-27 54 1088 0 0,0-27 384 0 0,54 0-864 0 0,-27 26 128 0 0,27-26 32 0 0,-1 0 192 0 0,1 0-32 0 0,0 27 161 0 0,0-27 799 0 0,0 0 0 0 0,-27 0 0 0 0</inkml:trace>
+</inkml:ink>
+</file>
+
+<file path=ppt/ink/ink11.xml><?xml version="1.0" encoding="utf-8"?>
 <inkml:ink xmlns:inkml="http://www.w3.org/2003/InkML">
   <inkml:definitions>
     <inkml:context xml:id="ctx0">
@@ -1742,19 +1995,142 @@
           <inkml:channelProperty channel="OE" name="resolution" value="1000" units="1/deg"/>
         </inkml:channelProperties>
       </inkml:inkSource>
-      <inkml:timestamp xml:id="ts0" timeString="2020-04-29T14:22:21.337"/>
+      <inkml:timestamp xml:id="ts0" timeString="2020-05-03T13:48:35.169"/>
     </inkml:context>
     <inkml:brush xml:id="br0">
-      <inkml:brushProperty name="width" value="0.1" units="cm"/>
-      <inkml:brushProperty name="height" value="0.1" units="cm"/>
-      <inkml:brushProperty name="color" value="#E71224"/>
+      <inkml:brushProperty name="width" value="0.025" units="cm"/>
+      <inkml:brushProperty name="height" value="0.025" units="cm"/>
     </inkml:brush>
   </inkml:definitions>
-  <inkml:trace contextRef="#ctx0" brushRef="#br0">6000 11212 11999 0 0,'-27'-27'992'0'0,"27"0"-1888"0"0,-27-27-96 0 0,0 54 416 0 0,0-26 320 0 0,1 26-672 0 0,26-27-960 0 0,-27 54 1088 0 0,0-27 384 0 0,54 0-864 0 0,-27 26 128 0 0,27-26 32 0 0,-1 0 192 0 0,1 0-32 0 0,0 27 161 0 0,0-27 799 0 0,0 0 0 0 0,-27 0 0 0 0</inkml:trace>
+  <inkml:trace contextRef="#ctx0" brushRef="#br0">20546 12056 0 0 0,'0'20'0'0'0,"19"-20"3647"0"0,-19-20-3551 0 0,0 40 1248 0 0,0-1 256 0 0,0 0-1056 0 0,-19-19-256 0 0,19 20 0 0 0,0 19 448 0 0,0-20-576 0 0,0 1-32 0 0,-20-20-32 0 0,20 19-32 0 0,0 0 32 0 0,-19 1-64 0 0,19-1 0 0 0,0 1 32 0 0,-19-20-32 0 0,19 19-64 0 0,0 0 32 0 0,0 1-64 0 0,19-20 64 0 0,-19 19-32 0 0,0 1 32 0 0,0-1 0 0 0,0 1 64 0 0,0-1 64 0 0,0 0-128 0 0,0-38-64 0 0,0 38 32 0 0,0-38 0 0 0,0 38 0 0 0,0-38 32 0 0,19 38 0 0 0,-19 1 32 0 0,20-20-64 0 0,-20 19 64 0 0,19 1 0 0 0,-19-1 64 0 0,-19 0-64 0 0,19 1 0 0 0,0-1 0 0 0,0 1-32 0 0,0-1 0 0 0,0 1-32 0 0,0-1 96 0 0,0 0 0 0 0,0 1-32 0 0,19-1-32 0 0,-19 1 32 0 0,0-1 0 0 0,0 1-32 0 0,0-1 0 0 0,0 0 32 0 0,0 1-32 0 0,0-1 32 0 0,0 1-32 0 0,0-1 32 0 0,0 0 64 0 0,20-19-96 0 0,-40 0 32 0 0,20 20 0 0 0,20-20 0 0 0,-40 0 0 0 0,20 19-32 0 0,0 1 96 0 0,0-1 0 0 0,0 1-128 0 0,0-1 64 0 0,0 0 32 0 0,0 1 0 0 0,0-1-64 0 0,0 1 96 0 0,0-1-64 0 0,0 0 32 0 0,0 1-96 0 0,0-1 128 0 0,0 1-128 0 0,0-1 128 0 0,0 1 32 0 0,0-1 32 0 0,-19-19-160 0 0,19 19 32 0 0,0-38-64 0 0,19 19-288 0 0,-19-19-2976 0 0,-19-20-3935 0 0,19 39 7231 0 0</inkml:trace>
 </inkml:ink>
 </file>
 
 <file path=ppt/ink/ink3.xml><?xml version="1.0" encoding="utf-8"?>
+<inkml:ink xmlns:inkml="http://www.w3.org/2003/InkML">
+  <inkml:definitions>
+    <inkml:context xml:id="ctx0">
+      <inkml:inkSource xml:id="inkSrc0">
+        <inkml:traceFormat>
+          <inkml:channel name="X" type="integer" min="-2.14748E9" max="2.14748E9" units="cm"/>
+          <inkml:channel name="Y" type="integer" min="-2.14748E9" max="2.14748E9" units="cm"/>
+          <inkml:channel name="F" type="integer" max="32767" units="dev"/>
+          <inkml:channel name="OA" type="integer" max="360" units="deg"/>
+          <inkml:channel name="OE" type="integer" max="90" units="deg"/>
+        </inkml:traceFormat>
+        <inkml:channelProperties>
+          <inkml:channelProperty channel="X" name="resolution" value="1000" units="1/cm"/>
+          <inkml:channelProperty channel="Y" name="resolution" value="1000" units="1/cm"/>
+          <inkml:channelProperty channel="F" name="resolution" value="0" units="1/dev"/>
+          <inkml:channelProperty channel="OA" name="resolution" value="1000" units="1/deg"/>
+          <inkml:channelProperty channel="OE" name="resolution" value="1000" units="1/deg"/>
+        </inkml:channelProperties>
+      </inkml:inkSource>
+      <inkml:timestamp xml:id="ts0" timeString="2020-05-03T13:48:35.170"/>
+    </inkml:context>
+    <inkml:brush xml:id="br0">
+      <inkml:brushProperty name="width" value="0.025" units="cm"/>
+      <inkml:brushProperty name="height" value="0.025" units="cm"/>
+    </inkml:brush>
+  </inkml:definitions>
+  <inkml:trace contextRef="#ctx0" brushRef="#br0">20472 13750 0 0 0,'0'-19'127'0'0,"0"38"161"0"0,0 1-192 0 0,-20-20-128 0 0,20-20 96 0 0,20 20-64 0 0,-20-19 64 0 0,0 38 3328 0 0,0-38-2528 0 0,19 19-832 0 0,-19-20 256 0 0,20 40 3552 0 0,-20-1-3424 0 0,19-19-416 0 0,-19-19 64 0 0,19 19 192 0 0,1 0-128 0 0,-20-20-96 0 0,19 1 64 0 0,-19-1 0 0 0,0 1 32 0 0,20 19-128 0 0,-20-19-32 0 0,0-1-64 0 0,0 1 64 0 0,19 19 32 0 0,-19-20 64 0 0,-19 20-64 0 0,19-19-32 0 0,0 0-96 0 0,19 19 0 0 0,-19-20-32 0 0,0 1 0 0 0,19 19 128 0 0,-19-20 64 0 0,0 1-32 0 0,0-1 0 0 0,20 20-32 0 0,-20-19 32 0 0,0 0 0 0 0,0-1 0 0 0,0 1 0 0 0,19 19 0 0 0,-19-20 0 0 0,0 1-32 0 0,0 0 32 0 0,0-1 32 0 0,0 1-64 0 0,20 19 32 0 0,-40 0 32 0 0,20-20 64 0 0,0 1-96 0 0,0-1 32 0 0,-19 20 0 0 0,19-19 0 0 0,-20 38 96 0 0,20-38-160 0 0,0 0-256 0 0,20 19 192 0 0,-20-20 96 0 0,0 1 160 0 0,19 19 32 0 0,-38-20-128 0 0,19 1 32 0 0,-20 19 480 0 0,20-20-704 0 0,20 1-96 0 0,-20 0 224 0 0,0-1 288 0 0,0 40-192 0 0,-20-20-96 0 0,1 0 64 0 0,19 19-64 0 0,-19-19 0 0 0,19-19-448 0 0,19 19 192 0 0,-19-20-64 0 0,19 1-4768 0 0,-19-1 2080 0 0,0 20 1537 0 0</inkml:trace>
+</inkml:ink>
+</file>
+
+<file path=ppt/ink/ink4.xml><?xml version="1.0" encoding="utf-8"?>
+<inkml:ink xmlns:inkml="http://www.w3.org/2003/InkML">
+  <inkml:definitions>
+    <inkml:context xml:id="ctx0">
+      <inkml:inkSource xml:id="inkSrc0">
+        <inkml:traceFormat>
+          <inkml:channel name="X" type="integer" min="-2.14748E9" max="2.14748E9" units="cm"/>
+          <inkml:channel name="Y" type="integer" min="-2.14748E9" max="2.14748E9" units="cm"/>
+          <inkml:channel name="F" type="integer" max="32767" units="dev"/>
+          <inkml:channel name="OA" type="integer" max="360" units="deg"/>
+          <inkml:channel name="OE" type="integer" max="90" units="deg"/>
+        </inkml:traceFormat>
+        <inkml:channelProperties>
+          <inkml:channelProperty channel="X" name="resolution" value="1000" units="1/cm"/>
+          <inkml:channelProperty channel="Y" name="resolution" value="1000" units="1/cm"/>
+          <inkml:channelProperty channel="F" name="resolution" value="0" units="1/dev"/>
+          <inkml:channelProperty channel="OA" name="resolution" value="1000" units="1/deg"/>
+          <inkml:channelProperty channel="OE" name="resolution" value="1000" units="1/deg"/>
+        </inkml:channelProperties>
+      </inkml:inkSource>
+      <inkml:timestamp xml:id="ts0" timeString="2020-05-03T13:48:35.171"/>
+    </inkml:context>
+    <inkml:brush xml:id="br0">
+      <inkml:brushProperty name="width" value="0.025" units="cm"/>
+      <inkml:brushProperty name="height" value="0.025" units="cm"/>
+    </inkml:brush>
+  </inkml:definitions>
+  <inkml:trace contextRef="#ctx0" brushRef="#br0">20405 14092 0 0 0,'-20'0'415'0'0,"20"20"-287"0"0,-19-20-96 0 0,19 19 0 0 0,0 1 0 0 0,0-40-32 0 0,-20 20 160 0 0,40 0-160 0 0,-1 0 1440 0 0,-19-19-1152 0 0,20 19-192 0 0,-1 0 928 0 0,-19-20-576 0 0,20 20 480 0 0,-1 0 32 0 0,-19-19-768 0 0,19 19-160 0 0,-19 19 96 0 0,0-38-64 0 0,20 19 96 0 0,-20-20 64 0 0,19 20-160 0 0,-19-19 32 0 0,20 19-64 0 0,-20-19 64 0 0,19 19-32 0 0,-19-20 0 0 0,0 1-32 0 0,19 19-32 0 0,-19-20 96 0 0,20 20-96 0 0,-20-19-32 0 0,19-1-32 0 0,-19 1 96 0 0,20 19 0 0 0,-20-19-64 0 0,0-1 256 0 0,0 1-256 0 0,19 19-32 0 0,-19-20 32 0 0,0 1 32 0 0,20 19 0 0 0,-20-19-32 0 0,19 19 32 0 0,-19-20 0 0 0,0 1 64 0 0,0-1-64 0 0,0 1 64 0 0,0-1-64 0 0,0 1 32 0 0,0 0-96 0 0,0-1 128 0 0,0 1 96 0 0,0-1-192 0 0,0 1-32 0 0,0 0-64 0 0,19 19 288 0 0,-38 0-96 0 0,19-20 288 0 0,-19 20 352 0 0,19-19-768 0 0,-20 19 160 0 0,20-20-224 0 0,20 20-1568 0 0,-20-19 1376 0 0,0-1-3808 0 0,19 20 2464 0 0,-19-19 1440 0 0,0 38-351 0 0,0-19 575 0 0</inkml:trace>
+</inkml:ink>
+</file>
+
+<file path=ppt/ink/ink5.xml><?xml version="1.0" encoding="utf-8"?>
+<inkml:ink xmlns:inkml="http://www.w3.org/2003/InkML">
+  <inkml:definitions>
+    <inkml:context xml:id="ctx0">
+      <inkml:inkSource xml:id="inkSrc0">
+        <inkml:traceFormat>
+          <inkml:channel name="X" type="integer" min="-2.14748E9" max="2.14748E9" units="cm"/>
+          <inkml:channel name="Y" type="integer" min="-2.14748E9" max="2.14748E9" units="cm"/>
+          <inkml:channel name="F" type="integer" max="32767" units="dev"/>
+          <inkml:channel name="OA" type="integer" max="360" units="deg"/>
+          <inkml:channel name="OE" type="integer" max="90" units="deg"/>
+        </inkml:traceFormat>
+        <inkml:channelProperties>
+          <inkml:channelProperty channel="X" name="resolution" value="1000" units="1/cm"/>
+          <inkml:channelProperty channel="Y" name="resolution" value="1000" units="1/cm"/>
+          <inkml:channelProperty channel="F" name="resolution" value="0" units="1/dev"/>
+          <inkml:channelProperty channel="OA" name="resolution" value="1000" units="1/deg"/>
+          <inkml:channelProperty channel="OE" name="resolution" value="1000" units="1/deg"/>
+        </inkml:channelProperties>
+      </inkml:inkSource>
+      <inkml:timestamp xml:id="ts0" timeString="2020-05-03T13:48:35.172"/>
+    </inkml:context>
+    <inkml:brush xml:id="br0">
+      <inkml:brushProperty name="width" value="0.025" units="cm"/>
+      <inkml:brushProperty name="height" value="0.025" units="cm"/>
+    </inkml:brush>
+  </inkml:definitions>
+  <inkml:trace contextRef="#ctx0" brushRef="#br0">20470 12197 0 0 0,'19'0'735'0'0,"-19"-19"-511"0"0,20 19-224 0 0,-20-19 0 0 0,0-1 0 0 0,19 20 0 0 0,-19-19 0 0 0,20 19 96 0 0,-20-20-32 0 0,19 20 480 0 0,-38 0-544 0 0,38 0 32 0 0,-38 0-32 0 0,38 0 32 0 0,-38 0-64 0 0,38 0 32 0 0,-19-19 0 0 0,-19 19 160 0 0,19-19-256 0 0,0 38 224 0 0,0-38-256 0 0,0-1-160 0 0,19 20 256 0 0,-19-19 0 0 0,0-1 96 0 0,0 40 0 0 0,0-1-64 0 0,-19-19-384 0 0,19 20 288 0 0,0-20-959 0 0</inkml:trace>
+</inkml:ink>
+</file>
+
+<file path=ppt/ink/ink6.xml><?xml version="1.0" encoding="utf-8"?>
+<inkml:ink xmlns:inkml="http://www.w3.org/2003/InkML">
+  <inkml:definitions>
+    <inkml:context xml:id="ctx0">
+      <inkml:inkSource xml:id="inkSrc0">
+        <inkml:traceFormat>
+          <inkml:channel name="X" type="integer" min="-2.14748E9" max="2.14748E9" units="cm"/>
+          <inkml:channel name="Y" type="integer" min="-2.14748E9" max="2.14748E9" units="cm"/>
+          <inkml:channel name="F" type="integer" max="32767" units="dev"/>
+          <inkml:channel name="OA" type="integer" max="360" units="deg"/>
+          <inkml:channel name="OE" type="integer" max="90" units="deg"/>
+        </inkml:traceFormat>
+        <inkml:channelProperties>
+          <inkml:channelProperty channel="X" name="resolution" value="1000" units="1/cm"/>
+          <inkml:channelProperty channel="Y" name="resolution" value="1000" units="1/cm"/>
+          <inkml:channelProperty channel="F" name="resolution" value="0" units="1/dev"/>
+          <inkml:channelProperty channel="OA" name="resolution" value="1000" units="1/deg"/>
+          <inkml:channelProperty channel="OE" name="resolution" value="1000" units="1/deg"/>
+        </inkml:channelProperties>
+      </inkml:inkSource>
+      <inkml:timestamp xml:id="ts0" timeString="2020-05-03T13:48:35.173"/>
+    </inkml:context>
+    <inkml:brush xml:id="br0">
+      <inkml:brushProperty name="width" value="0.025" units="cm"/>
+      <inkml:brushProperty name="height" value="0.025" units="cm"/>
+    </inkml:brush>
+  </inkml:definitions>
+  <inkml:trace contextRef="#ctx0" brushRef="#br0">20489 12145 0 0 0,'0'19'575'0'0,"-19"-19"-543"0"0,19 19 32 0 0,0-38-32 0 0,19 19-32 0 0,-19-19 320 0 0,0-1-256 0 0,20 20 0 0 0,-20-19-96 0 0,19 19 64 0 0,-19-20 0 0 0,20 20 64 0 0,-20-19-64 0 0,0-1 32 0 0,19 20 192 0 0,-19-19-160 0 0,0 0 544 0 0,-19 19-448 0 0,38 0-288 0 0,-38 0 160 0 0,19 19 352 0 0,0-38-1152 0 0,0-1-192 0 0,0 1 992 0 0,0-1-96 0 0,0 40 192 0 0,0-1-256 0 0,0 1-320 0 0,-20-40-543 0 0,20 20 959 0 0</inkml:trace>
+</inkml:ink>
+</file>
+
+<file path=ppt/ink/ink7.xml><?xml version="1.0" encoding="utf-8"?>
 <inkml:ink xmlns:inkml="http://www.w3.org/2003/InkML">
   <inkml:definitions>
     <inkml:context xml:id="ctx0">
@@ -1786,7 +2162,7 @@
 </inkml:ink>
 </file>
 
-<file path=ppt/ink/ink4.xml><?xml version="1.0" encoding="utf-8"?>
+<file path=ppt/ink/ink8.xml><?xml version="1.0" encoding="utf-8"?>
 <inkml:ink xmlns:inkml="http://www.w3.org/2003/InkML">
   <inkml:definitions>
     <inkml:context xml:id="ctx0">
@@ -1818,39 +2194,7 @@
 </inkml:ink>
 </file>
 
-<file path=ppt/ink/ink5.xml><?xml version="1.0" encoding="utf-8"?>
-<inkml:ink xmlns:inkml="http://www.w3.org/2003/InkML">
-  <inkml:definitions>
-    <inkml:context xml:id="ctx0">
-      <inkml:inkSource xml:id="inkSrc0">
-        <inkml:traceFormat>
-          <inkml:channel name="X" type="integer" min="-2.14748E9" max="2.14748E9" units="cm"/>
-          <inkml:channel name="Y" type="integer" min="-2.14748E9" max="2.14748E9" units="cm"/>
-          <inkml:channel name="F" type="integer" max="32767" units="dev"/>
-          <inkml:channel name="OA" type="integer" max="360" units="deg"/>
-          <inkml:channel name="OE" type="integer" max="90" units="deg"/>
-        </inkml:traceFormat>
-        <inkml:channelProperties>
-          <inkml:channelProperty channel="X" name="resolution" value="1000" units="1/cm"/>
-          <inkml:channelProperty channel="Y" name="resolution" value="1000" units="1/cm"/>
-          <inkml:channelProperty channel="F" name="resolution" value="0" units="1/dev"/>
-          <inkml:channelProperty channel="OA" name="resolution" value="1000" units="1/deg"/>
-          <inkml:channelProperty channel="OE" name="resolution" value="1000" units="1/deg"/>
-        </inkml:channelProperties>
-      </inkml:inkSource>
-      <inkml:timestamp xml:id="ts0" timeString="2020-04-29T14:22:21.337"/>
-    </inkml:context>
-    <inkml:brush xml:id="br0">
-      <inkml:brushProperty name="width" value="0.1" units="cm"/>
-      <inkml:brushProperty name="height" value="0.1" units="cm"/>
-      <inkml:brushProperty name="color" value="#E71224"/>
-    </inkml:brush>
-  </inkml:definitions>
-  <inkml:trace contextRef="#ctx0" brushRef="#br0">6000 11212 11999 0 0,'-27'-27'992'0'0,"27"0"-1888"0"0,-27-27-96 0 0,0 54 416 0 0,0-26 320 0 0,1 26-672 0 0,26-27-960 0 0,-27 54 1088 0 0,0-27 384 0 0,54 0-864 0 0,-27 26 128 0 0,27-26 32 0 0,-1 0 192 0 0,1 0-32 0 0,0 27 161 0 0,0-27 799 0 0,0 0 0 0 0,-27 0 0 0 0</inkml:trace>
-</inkml:ink>
-</file>
-
-<file path=ppt/ink/ink6.xml><?xml version="1.0" encoding="utf-8"?>
+<file path=ppt/ink/ink9.xml><?xml version="1.0" encoding="utf-8"?>
 <inkml:ink xmlns:inkml="http://www.w3.org/2003/InkML">
   <inkml:definitions>
     <inkml:context xml:id="ctx0">
@@ -2029,7 +2373,7 @@
           <a:p>
             <a:fld id="{DFEF7640-E7CA-41C6-BF35-DCCB2ED5DC60}" type="datetimeFigureOut">
               <a:rPr lang="fr-FR" smtClean="0"/>
-              <a:t>02/05/2020</a:t>
+              <a:t>18/05/2020</a:t>
             </a:fld>
             <a:endParaRPr lang="fr-FR"/>
           </a:p>
@@ -2227,7 +2571,7 @@
           <a:p>
             <a:fld id="{DFEF7640-E7CA-41C6-BF35-DCCB2ED5DC60}" type="datetimeFigureOut">
               <a:rPr lang="fr-FR" smtClean="0"/>
-              <a:t>02/05/2020</a:t>
+              <a:t>18/05/2020</a:t>
             </a:fld>
             <a:endParaRPr lang="fr-FR"/>
           </a:p>
@@ -2435,7 +2779,7 @@
           <a:p>
             <a:fld id="{DFEF7640-E7CA-41C6-BF35-DCCB2ED5DC60}" type="datetimeFigureOut">
               <a:rPr lang="fr-FR" smtClean="0"/>
-              <a:t>02/05/2020</a:t>
+              <a:t>18/05/2020</a:t>
             </a:fld>
             <a:endParaRPr lang="fr-FR"/>
           </a:p>
@@ -2633,7 +2977,7 @@
           <a:p>
             <a:fld id="{DFEF7640-E7CA-41C6-BF35-DCCB2ED5DC60}" type="datetimeFigureOut">
               <a:rPr lang="fr-FR" smtClean="0"/>
-              <a:t>02/05/2020</a:t>
+              <a:t>18/05/2020</a:t>
             </a:fld>
             <a:endParaRPr lang="fr-FR"/>
           </a:p>
@@ -2908,7 +3252,7 @@
           <a:p>
             <a:fld id="{DFEF7640-E7CA-41C6-BF35-DCCB2ED5DC60}" type="datetimeFigureOut">
               <a:rPr lang="fr-FR" smtClean="0"/>
-              <a:t>02/05/2020</a:t>
+              <a:t>18/05/2020</a:t>
             </a:fld>
             <a:endParaRPr lang="fr-FR"/>
           </a:p>
@@ -3173,7 +3517,7 @@
           <a:p>
             <a:fld id="{DFEF7640-E7CA-41C6-BF35-DCCB2ED5DC60}" type="datetimeFigureOut">
               <a:rPr lang="fr-FR" smtClean="0"/>
-              <a:t>02/05/2020</a:t>
+              <a:t>18/05/2020</a:t>
             </a:fld>
             <a:endParaRPr lang="fr-FR"/>
           </a:p>
@@ -3585,7 +3929,7 @@
           <a:p>
             <a:fld id="{DFEF7640-E7CA-41C6-BF35-DCCB2ED5DC60}" type="datetimeFigureOut">
               <a:rPr lang="fr-FR" smtClean="0"/>
-              <a:t>02/05/2020</a:t>
+              <a:t>18/05/2020</a:t>
             </a:fld>
             <a:endParaRPr lang="fr-FR"/>
           </a:p>
@@ -3726,7 +4070,7 @@
           <a:p>
             <a:fld id="{DFEF7640-E7CA-41C6-BF35-DCCB2ED5DC60}" type="datetimeFigureOut">
               <a:rPr lang="fr-FR" smtClean="0"/>
-              <a:t>02/05/2020</a:t>
+              <a:t>18/05/2020</a:t>
             </a:fld>
             <a:endParaRPr lang="fr-FR"/>
           </a:p>
@@ -3839,7 +4183,7 @@
           <a:p>
             <a:fld id="{DFEF7640-E7CA-41C6-BF35-DCCB2ED5DC60}" type="datetimeFigureOut">
               <a:rPr lang="fr-FR" smtClean="0"/>
-              <a:t>02/05/2020</a:t>
+              <a:t>18/05/2020</a:t>
             </a:fld>
             <a:endParaRPr lang="fr-FR"/>
           </a:p>
@@ -4150,7 +4494,7 @@
           <a:p>
             <a:fld id="{DFEF7640-E7CA-41C6-BF35-DCCB2ED5DC60}" type="datetimeFigureOut">
               <a:rPr lang="fr-FR" smtClean="0"/>
-              <a:t>02/05/2020</a:t>
+              <a:t>18/05/2020</a:t>
             </a:fld>
             <a:endParaRPr lang="fr-FR"/>
           </a:p>
@@ -4438,7 +4782,7 @@
           <a:p>
             <a:fld id="{DFEF7640-E7CA-41C6-BF35-DCCB2ED5DC60}" type="datetimeFigureOut">
               <a:rPr lang="fr-FR" smtClean="0"/>
-              <a:t>02/05/2020</a:t>
+              <a:t>18/05/2020</a:t>
             </a:fld>
             <a:endParaRPr lang="fr-FR"/>
           </a:p>
@@ -4679,7 +5023,7 @@
           <a:p>
             <a:fld id="{DFEF7640-E7CA-41C6-BF35-DCCB2ED5DC60}" type="datetimeFigureOut">
               <a:rPr lang="fr-FR" smtClean="0"/>
-              <a:t>02/05/2020</a:t>
+              <a:t>18/05/2020</a:t>
             </a:fld>
             <a:endParaRPr lang="fr-FR"/>
           </a:p>
@@ -5390,7 +5734,7 @@
           <a:p>
             <a:pPr algn="l"/>
             <a:r>
-              <a:rPr lang="fr-FR" sz="8000"/>
+              <a:rPr lang="fr-FR" sz="8000" dirty="0"/>
               <a:t>Soutenance python</a:t>
             </a:r>
           </a:p>
@@ -7089,28 +7433,15 @@
           <a:noFill/>
         </p:spPr>
         <p:txBody>
-          <a:bodyPr wrap="square" rtlCol="0">
+          <a:bodyPr wrap="square" rtlCol="0" anchor="t">
             <a:spAutoFit/>
           </a:bodyPr>
           <a:lstStyle/>
           <a:p>
             <a:r>
               <a:rPr lang="fr-FR"/>
-              <a:t>Ceci est la fin du jeu  quand vous avez  </a:t>
-            </a:r>
-            <a:r>
-              <a:rPr lang="fr-FR" err="1"/>
-              <a:t>recupere</a:t>
-            </a:r>
-            <a:r>
-              <a:rPr lang="fr-FR"/>
-              <a:t> les 3 objets plus le gardien votre objectif est </a:t>
-            </a:r>
-            <a:r>
-              <a:rPr lang="fr-FR" err="1"/>
-              <a:t>atteind</a:t>
-            </a:r>
-            <a:endParaRPr lang="fr-FR"/>
+              <a:t>Ceci est la fin du jeu  quand vous avez  récupère les 3 objets plus le gardien votre objectif est atteint</a:t>
+            </a:r>
           </a:p>
         </p:txBody>
       </p:sp>
@@ -7615,20 +7946,15 @@
           <a:noFill/>
         </p:spPr>
         <p:txBody>
-          <a:bodyPr wrap="square" rtlCol="0">
+          <a:bodyPr wrap="square" rtlCol="0" anchor="t">
             <a:spAutoFit/>
           </a:bodyPr>
           <a:lstStyle/>
           <a:p>
             <a:r>
               <a:rPr lang="fr-FR"/>
-              <a:t>Ceci est la fin du jeu quand vous tuer directement le gardien sans les </a:t>
-            </a:r>
-            <a:r>
-              <a:rPr lang="fr-FR" err="1"/>
-              <a:t>objects</a:t>
-            </a:r>
-            <a:endParaRPr lang="fr-FR"/>
+              <a:t>Ceci est la fin du jeu quand vous tuer directement le gardien sans les objets</a:t>
+            </a:r>
           </a:p>
         </p:txBody>
       </p:sp>
@@ -8140,7 +8466,7 @@
         </p:nvSpPr>
         <p:spPr>
           <a:xfrm>
-            <a:off x="921391" y="844492"/>
+            <a:off x="930916" y="854017"/>
             <a:ext cx="9734025" cy="369332"/>
           </a:xfrm>
           <a:prstGeom prst="rect">
@@ -8188,7 +8514,7 @@
         </p:blipFill>
         <p:spPr>
           <a:xfrm>
-            <a:off x="551129" y="2139653"/>
+            <a:off x="-4938878" y="2165453"/>
             <a:ext cx="10893706" cy="3791883"/>
           </a:xfrm>
           <a:prstGeom prst="rect">
@@ -8196,6 +8522,261 @@
           </a:prstGeom>
         </p:spPr>
       </p:pic>
+      <mc:AlternateContent xmlns:mc="http://schemas.openxmlformats.org/markup-compatibility/2006" xmlns:p14="http://schemas.microsoft.com/office/powerpoint/2010/main">
+        <mc:Choice Requires="p14">
+          <p:contentPart p14:bwMode="auto" r:id="rId5">
+            <p14:nvContentPartPr>
+              <p14:cNvPr id="2" name="Encre 1">
+                <a:extLst>
+                  <a:ext uri="{FF2B5EF4-FFF2-40B4-BE49-F238E27FC236}">
+                    <a16:creationId xmlns:a16="http://schemas.microsoft.com/office/drawing/2014/main" id="{78CB88BC-A410-47B1-885B-E7223FD2E23D}"/>
+                  </a:ext>
+                </a:extLst>
+              </p14:cNvPr>
+              <p14:cNvContentPartPr/>
+              <p14:nvPr/>
+            </p14:nvContentPartPr>
+            <p14:xfrm>
+              <a:off x="8025468" y="4369266"/>
+              <a:ext cx="38099" cy="457199"/>
+            </p14:xfrm>
+          </p:contentPart>
+        </mc:Choice>
+        <mc:Fallback xmlns="">
+          <p:pic>
+            <p:nvPicPr>
+              <p:cNvPr id="2" name="Encre 1">
+                <a:extLst>
+                  <a:ext uri="{FF2B5EF4-FFF2-40B4-BE49-F238E27FC236}">
+                    <a16:creationId xmlns:a16="http://schemas.microsoft.com/office/drawing/2014/main" id="{78CB88BC-A410-47B1-885B-E7223FD2E23D}"/>
+                  </a:ext>
+                </a:extLst>
+              </p:cNvPr>
+              <p:cNvPicPr/>
+              <p:nvPr/>
+            </p:nvPicPr>
+            <p:blipFill>
+              <a:blip r:embed="rId6"/>
+              <a:stretch>
+                <a:fillRect/>
+              </a:stretch>
+            </p:blipFill>
+            <p:spPr>
+              <a:xfrm>
+                <a:off x="8020803" y="4364922"/>
+                <a:ext cx="47429" cy="465887"/>
+              </a:xfrm>
+              <a:prstGeom prst="rect">
+                <a:avLst/>
+              </a:prstGeom>
+            </p:spPr>
+          </p:pic>
+        </mc:Fallback>
+      </mc:AlternateContent>
+      <mc:AlternateContent xmlns:mc="http://schemas.openxmlformats.org/markup-compatibility/2006" xmlns:p14="http://schemas.microsoft.com/office/powerpoint/2010/main">
+        <mc:Choice Requires="p14">
+          <p:contentPart p14:bwMode="auto" r:id="rId7">
+            <p14:nvContentPartPr>
+              <p14:cNvPr id="4" name="Encre 3">
+                <a:extLst>
+                  <a:ext uri="{FF2B5EF4-FFF2-40B4-BE49-F238E27FC236}">
+                    <a16:creationId xmlns:a16="http://schemas.microsoft.com/office/drawing/2014/main" id="{DCF8C50D-4E13-4AE2-956A-57D0A23D62FE}"/>
+                  </a:ext>
+                </a:extLst>
+              </p14:cNvPr>
+              <p14:cNvContentPartPr/>
+              <p14:nvPr/>
+            </p14:nvContentPartPr>
+            <p14:xfrm>
+              <a:off x="8011486" y="4732789"/>
+              <a:ext cx="95250" cy="285749"/>
+            </p14:xfrm>
+          </p:contentPart>
+        </mc:Choice>
+        <mc:Fallback xmlns="">
+          <p:pic>
+            <p:nvPicPr>
+              <p:cNvPr id="4" name="Encre 3">
+                <a:extLst>
+                  <a:ext uri="{FF2B5EF4-FFF2-40B4-BE49-F238E27FC236}">
+                    <a16:creationId xmlns:a16="http://schemas.microsoft.com/office/drawing/2014/main" id="{DCF8C50D-4E13-4AE2-956A-57D0A23D62FE}"/>
+                  </a:ext>
+                </a:extLst>
+              </p:cNvPr>
+              <p:cNvPicPr/>
+              <p:nvPr/>
+            </p:nvPicPr>
+            <p:blipFill>
+              <a:blip r:embed="rId8"/>
+              <a:stretch>
+                <a:fillRect/>
+              </a:stretch>
+            </p:blipFill>
+            <p:spPr>
+              <a:xfrm>
+                <a:off x="8006986" y="4728492"/>
+                <a:ext cx="104250" cy="294343"/>
+              </a:xfrm>
+              <a:prstGeom prst="rect">
+                <a:avLst/>
+              </a:prstGeom>
+            </p:spPr>
+          </p:pic>
+        </mc:Fallback>
+      </mc:AlternateContent>
+      <mc:AlternateContent xmlns:mc="http://schemas.openxmlformats.org/markup-compatibility/2006" xmlns:p14="http://schemas.microsoft.com/office/powerpoint/2010/main">
+        <mc:Choice Requires="p14">
+          <p:contentPart p14:bwMode="auto" r:id="rId9">
+            <p14:nvContentPartPr>
+              <p14:cNvPr id="5" name="Encre 4">
+                <a:extLst>
+                  <a:ext uri="{FF2B5EF4-FFF2-40B4-BE49-F238E27FC236}">
+                    <a16:creationId xmlns:a16="http://schemas.microsoft.com/office/drawing/2014/main" id="{C79B4073-5079-4793-85E7-94233C1423E2}"/>
+                  </a:ext>
+                </a:extLst>
+              </p14:cNvPr>
+              <p14:cNvContentPartPr/>
+              <p14:nvPr/>
+            </p14:nvContentPartPr>
+            <p14:xfrm>
+              <a:off x="7969541" y="4914551"/>
+              <a:ext cx="133350" cy="257174"/>
+            </p14:xfrm>
+          </p:contentPart>
+        </mc:Choice>
+        <mc:Fallback xmlns="">
+          <p:pic>
+            <p:nvPicPr>
+              <p:cNvPr id="5" name="Encre 4">
+                <a:extLst>
+                  <a:ext uri="{FF2B5EF4-FFF2-40B4-BE49-F238E27FC236}">
+                    <a16:creationId xmlns:a16="http://schemas.microsoft.com/office/drawing/2014/main" id="{C79B4073-5079-4793-85E7-94233C1423E2}"/>
+                  </a:ext>
+                </a:extLst>
+              </p:cNvPr>
+              <p:cNvPicPr/>
+              <p:nvPr/>
+            </p:nvPicPr>
+            <p:blipFill>
+              <a:blip r:embed="rId10"/>
+              <a:stretch>
+                <a:fillRect/>
+              </a:stretch>
+            </p:blipFill>
+            <p:spPr>
+              <a:xfrm>
+                <a:off x="7965216" y="4910265"/>
+                <a:ext cx="142000" cy="265746"/>
+              </a:xfrm>
+              <a:prstGeom prst="rect">
+                <a:avLst/>
+              </a:prstGeom>
+            </p:spPr>
+          </p:pic>
+        </mc:Fallback>
+      </mc:AlternateContent>
+      <mc:AlternateContent xmlns:mc="http://schemas.openxmlformats.org/markup-compatibility/2006" xmlns:p14="http://schemas.microsoft.com/office/powerpoint/2010/main">
+        <mc:Choice Requires="p14">
+          <p:contentPart p14:bwMode="auto" r:id="rId11">
+            <p14:nvContentPartPr>
+              <p14:cNvPr id="6" name="Encre 5">
+                <a:extLst>
+                  <a:ext uri="{FF2B5EF4-FFF2-40B4-BE49-F238E27FC236}">
+                    <a16:creationId xmlns:a16="http://schemas.microsoft.com/office/drawing/2014/main" id="{9A08BE55-1E38-409A-99E7-5C9A082CD9A7}"/>
+                  </a:ext>
+                </a:extLst>
+              </p14:cNvPr>
+              <p14:cNvContentPartPr/>
+              <p14:nvPr/>
+            </p14:nvContentPartPr>
+            <p14:xfrm>
+              <a:off x="8018478" y="4348293"/>
+              <a:ext cx="38099" cy="66675"/>
+            </p14:xfrm>
+          </p:contentPart>
+        </mc:Choice>
+        <mc:Fallback xmlns="">
+          <p:pic>
+            <p:nvPicPr>
+              <p:cNvPr id="6" name="Encre 5">
+                <a:extLst>
+                  <a:ext uri="{FF2B5EF4-FFF2-40B4-BE49-F238E27FC236}">
+                    <a16:creationId xmlns:a16="http://schemas.microsoft.com/office/drawing/2014/main" id="{9A08BE55-1E38-409A-99E7-5C9A082CD9A7}"/>
+                  </a:ext>
+                </a:extLst>
+              </p:cNvPr>
+              <p:cNvPicPr/>
+              <p:nvPr/>
+            </p:nvPicPr>
+            <p:blipFill>
+              <a:blip r:embed="rId12"/>
+              <a:stretch>
+                <a:fillRect/>
+              </a:stretch>
+            </p:blipFill>
+            <p:spPr>
+              <a:xfrm>
+                <a:off x="8013813" y="4344190"/>
+                <a:ext cx="47429" cy="74881"/>
+              </a:xfrm>
+              <a:prstGeom prst="rect">
+                <a:avLst/>
+              </a:prstGeom>
+            </p:spPr>
+          </p:pic>
+        </mc:Fallback>
+      </mc:AlternateContent>
+      <mc:AlternateContent xmlns:mc="http://schemas.openxmlformats.org/markup-compatibility/2006" xmlns:p14="http://schemas.microsoft.com/office/powerpoint/2010/main">
+        <mc:Choice Requires="p14">
+          <p:contentPart p14:bwMode="auto" r:id="rId13">
+            <p14:nvContentPartPr>
+              <p14:cNvPr id="14" name="Encre 13">
+                <a:extLst>
+                  <a:ext uri="{FF2B5EF4-FFF2-40B4-BE49-F238E27FC236}">
+                    <a16:creationId xmlns:a16="http://schemas.microsoft.com/office/drawing/2014/main" id="{F4F1187F-B6E4-4453-845D-F5D8369F3909}"/>
+                  </a:ext>
+                </a:extLst>
+              </p14:cNvPr>
+              <p14:cNvContentPartPr/>
+              <p14:nvPr/>
+            </p14:nvContentPartPr>
+            <p14:xfrm>
+              <a:off x="8018478" y="4327320"/>
+              <a:ext cx="38099" cy="85725"/>
+            </p14:xfrm>
+          </p:contentPart>
+        </mc:Choice>
+        <mc:Fallback xmlns="">
+          <p:pic>
+            <p:nvPicPr>
+              <p:cNvPr id="14" name="Encre 13">
+                <a:extLst>
+                  <a:ext uri="{FF2B5EF4-FFF2-40B4-BE49-F238E27FC236}">
+                    <a16:creationId xmlns:a16="http://schemas.microsoft.com/office/drawing/2014/main" id="{F4F1187F-B6E4-4453-845D-F5D8369F3909}"/>
+                  </a:ext>
+                </a:extLst>
+              </p:cNvPr>
+              <p:cNvPicPr/>
+              <p:nvPr/>
+            </p:nvPicPr>
+            <p:blipFill>
+              <a:blip r:embed="rId14"/>
+              <a:stretch>
+                <a:fillRect/>
+              </a:stretch>
+            </p:blipFill>
+            <p:spPr>
+              <a:xfrm>
+                <a:off x="8013813" y="4322924"/>
+                <a:ext cx="47429" cy="94517"/>
+              </a:xfrm>
+              <a:prstGeom prst="rect">
+                <a:avLst/>
+              </a:prstGeom>
+            </p:spPr>
+          </p:pic>
+        </mc:Fallback>
+      </mc:AlternateContent>
     </p:spTree>
     <p:extLst>
       <p:ext uri="{BB962C8B-B14F-4D97-AF65-F5344CB8AC3E}">
@@ -8720,7 +9301,7 @@
           <a:p>
             <a:r>
               <a:rPr lang="fr-FR"/>
-              <a:t>Quand je lance le jeu au départ je vais crée une classe labyrinthe qui se chargeras de crée le labyrinthe</a:t>
+              <a:t>Quand je lance le jeu au départ je vais créer une classe labyrinthe qui se chargeras de crée le labyrinthe</a:t>
             </a:r>
           </a:p>
           <a:p>
@@ -8728,17 +9309,23 @@
               <a:rPr lang="fr-FR"/>
               <a:t>Je vais chercher mon joueur et pouvoir lancer le jeu pour pouvoir lancer l’affichage</a:t>
             </a:r>
+            <a:endParaRPr lang="fr-FR">
+              <a:cs typeface="Calibri"/>
+            </a:endParaRPr>
           </a:p>
           <a:p>
             <a:r>
               <a:rPr lang="fr-FR"/>
-              <a:t>La classe labyrinthe  elle crée un tableau  pour charger celui-ci</a:t>
-            </a:r>
+              <a:t>La classe labyrinthe  elle crée un tableau  pour charger celui-ci</a:t>
+            </a:r>
+            <a:endParaRPr lang="fr-FR">
+              <a:cs typeface="Calibri"/>
+            </a:endParaRPr>
           </a:p>
           <a:p>
             <a:r>
               <a:rPr lang="fr-FR"/>
-              <a:t>Puis elle vas le charger dans la fonction  </a:t>
+              <a:t>Puis elle vas le charger dans la fonction  </a:t>
             </a:r>
             <a:r>
               <a:rPr lang="fr-FR" err="1"/>
@@ -8755,24 +9342,36 @@
               <a:rPr lang="fr-FR"/>
               <a:t> prend en paramètre l’adresse du fichier map.txt puis va parcourir toute les lignes </a:t>
             </a:r>
+            <a:endParaRPr lang="fr-FR">
+              <a:cs typeface="Calibri"/>
+            </a:endParaRPr>
           </a:p>
           <a:p>
             <a:r>
               <a:rPr lang="fr-FR"/>
-              <a:t>De celui-ci. Chaque caractere de chaque ligne et verifie si ce n’’est pas  un saut de ligne</a:t>
-            </a:r>
+              <a:t>De celui-ci. Chaque caractère de chaque ligne et vérifie si ce n’’est pas  un saut de ligne</a:t>
+            </a:r>
+            <a:endParaRPr lang="fr-FR">
+              <a:cs typeface="Calibri"/>
+            </a:endParaRPr>
           </a:p>
           <a:p>
             <a:r>
               <a:rPr lang="fr-FR"/>
-              <a:t>Si le caractere n’est pas un saut de ligne donc il ajoute le caractere # a la ligne du labyrinthe</a:t>
-            </a:r>
+              <a:t>Si le caractère n’est pas un saut de ligne donc il ajoute le caractère # a la ligne du labyrinthe</a:t>
+            </a:r>
+            <a:endParaRPr lang="fr-FR">
+              <a:cs typeface="Calibri"/>
+            </a:endParaRPr>
           </a:p>
           <a:p>
             <a:r>
               <a:rPr lang="fr-FR"/>
               <a:t>Puis on ajoute la ligne au labyrinthe.</a:t>
             </a:r>
+            <a:endParaRPr lang="fr-FR">
+              <a:cs typeface="Calibri"/>
+            </a:endParaRPr>
           </a:p>
           <a:p>
             <a:endParaRPr lang="fr-FR"/>
@@ -10593,14 +11192,14 @@
           <a:noFill/>
         </p:spPr>
         <p:txBody>
-          <a:bodyPr wrap="square" rtlCol="0">
+          <a:bodyPr wrap="square" rtlCol="0" anchor="t">
             <a:spAutoFit/>
           </a:bodyPr>
           <a:lstStyle/>
           <a:p>
             <a:r>
               <a:rPr lang="fr-FR"/>
-              <a:t>je rentre dans la boucle du jeu </a:t>
+              <a:t>je rentre dans la boucle du jeu </a:t>
             </a:r>
           </a:p>
           <a:p>
@@ -10608,12 +11207,18 @@
               <a:rPr lang="fr-FR"/>
               <a:t>Si c’est un élément de type QUIT je quitte le jeu</a:t>
             </a:r>
+            <a:endParaRPr lang="fr-FR">
+              <a:cs typeface="Calibri"/>
+            </a:endParaRPr>
           </a:p>
           <a:p>
             <a:r>
               <a:rPr lang="fr-FR"/>
-              <a:t>Sinon je verifi si correspondance au touche directionnel</a:t>
-            </a:r>
+              <a:t>Sinon je vérifie si correspondance au touche directionnel</a:t>
+            </a:r>
+            <a:endParaRPr lang="fr-FR">
+              <a:cs typeface="Calibri"/>
+            </a:endParaRPr>
           </a:p>
           <a:p>
             <a:r>
@@ -10626,13 +11231,24 @@
             </a:r>
             <a:r>
               <a:rPr lang="fr-FR"/>
-              <a:t> si le personnage a bouger et si il ne percute pas un mur</a:t>
-            </a:r>
-          </a:p>
-          <a:p>
+              <a:t> si le personnage </a:t>
+            </a:r>
+            <a:r>
+              <a:rPr lang="fr-FR" err="1"/>
+              <a:t>a</a:t>
+            </a:r>
             <a:r>
               <a:rPr lang="fr-FR"/>
-              <a:t>Verifi avec </a:t>
+              <a:t> bouger et si il ne percute pas un mur</a:t>
+            </a:r>
+            <a:endParaRPr lang="fr-FR">
+              <a:cs typeface="Calibri"/>
+            </a:endParaRPr>
+          </a:p>
+          <a:p>
+            <a:r>
+              <a:rPr lang="fr-FR"/>
+              <a:t>Vérifie avec </a:t>
             </a:r>
             <a:r>
               <a:rPr lang="fr-FR" err="1"/>
@@ -10640,7 +11256,7 @@
             </a:r>
             <a:r>
               <a:rPr lang="fr-FR"/>
-              <a:t>  la collision avec les </a:t>
+              <a:t>  la collision avec les </a:t>
             </a:r>
             <a:r>
               <a:rPr lang="fr-FR" err="1"/>
@@ -10648,14 +11264,20 @@
             </a:r>
             <a:r>
               <a:rPr lang="fr-FR"/>
-              <a:t> et le gardien  pour donner des points</a:t>
-            </a:r>
+              <a:t> et le gardien  pour donner des points</a:t>
+            </a:r>
+            <a:endParaRPr lang="fr-FR">
+              <a:cs typeface="Calibri"/>
+            </a:endParaRPr>
           </a:p>
           <a:p>
             <a:r>
               <a:rPr lang="fr-FR"/>
               <a:t>Et gère la fin du jeu</a:t>
             </a:r>
+            <a:endParaRPr lang="fr-FR">
+              <a:cs typeface="Calibri"/>
+            </a:endParaRPr>
           </a:p>
           <a:p>
             <a:r>
@@ -10664,19 +11286,25 @@
             </a:r>
             <a:r>
               <a:rPr lang="fr-FR"/>
-              <a:t>  met ajour la position de ‘m’</a:t>
-            </a:r>
+              <a:t>  met ajour la position de ‘m’</a:t>
+            </a:r>
+            <a:endParaRPr lang="fr-FR">
+              <a:cs typeface="Calibri"/>
+            </a:endParaRPr>
           </a:p>
           <a:p>
             <a:r>
               <a:rPr lang="fr-FR"/>
               <a:t>Le fait bouger d’une case vers la position souhaité</a:t>
             </a:r>
+            <a:endParaRPr lang="fr-FR">
+              <a:cs typeface="Calibri"/>
+            </a:endParaRPr>
           </a:p>
           <a:p>
             <a:r>
               <a:rPr lang="fr-FR"/>
-              <a:t>Et après je rafraichit l’affichage du labyrinthe  avec les nouvelles informations(position de ‘m’ , </a:t>
+              <a:t>Et après je rafraichit l’affichage du labyrinthe  avec les nouvelles informations(position de ‘m’ , </a:t>
             </a:r>
             <a:r>
               <a:rPr lang="fr-FR" err="1"/>
@@ -10686,6 +11314,9 @@
               <a:rPr lang="fr-FR"/>
               <a:t> pris ,gardien prit )</a:t>
             </a:r>
+            <a:endParaRPr lang="fr-FR">
+              <a:cs typeface="Calibri"/>
+            </a:endParaRPr>
           </a:p>
           <a:p>
             <a:br>
@@ -10695,6 +11326,9 @@
               <a:rPr lang="fr-FR"/>
               <a:t> </a:t>
             </a:r>
+            <a:endParaRPr lang="fr-FR">
+              <a:cs typeface="Calibri"/>
+            </a:endParaRPr>
           </a:p>
         </p:txBody>
       </p:sp>
@@ -11840,11 +12474,7 @@
             </a:pPr>
             <a:r>
               <a:rPr lang="fr-FR" sz="2000"/>
-              <a:t> je m’appelle monsieur Desombre </a:t>
-            </a:r>
-            <a:r>
-              <a:rPr lang="fr-FR" sz="2000" dirty="0"/>
-              <a:t>Alain je suis un employé de la logistique INTERMARCHE depuis 30 ans et 8 année dans un  magasin cora.</a:t>
+              <a:t> je m’appelle monsieur Desombre Alain je suis un employé de la logistique INTERMARCHE depuis 30 ans et 8 année dans un  magasin cora.</a:t>
             </a:r>
             <a:endParaRPr lang="fr-FR">
               <a:cs typeface="Calibri" panose="020F0502020204030204"/>
@@ -11855,10 +12485,10 @@
               <a:buNone/>
             </a:pPr>
             <a:r>
-              <a:rPr lang="fr-FR" sz="2000" dirty="0"/>
+              <a:rPr lang="fr-FR" sz="2000"/>
               <a:t>Depuis le 9 avril 2014 j’étudie vos cours.</a:t>
             </a:r>
-            <a:endParaRPr lang="fr-FR" sz="2000" dirty="0">
+            <a:endParaRPr lang="fr-FR" sz="2000">
               <a:cs typeface="Calibri"/>
             </a:endParaRPr>
           </a:p>
@@ -11867,10 +12497,10 @@
               <a:buNone/>
             </a:pPr>
             <a:r>
-              <a:rPr lang="fr-FR" sz="2000" dirty="0"/>
+              <a:rPr lang="fr-FR" sz="2000"/>
               <a:t>En espérant un jour pouvoir me diplôme chez vous.</a:t>
             </a:r>
-            <a:endParaRPr lang="fr-FR" sz="2000" dirty="0">
+            <a:endParaRPr lang="fr-FR" sz="2000">
               <a:cs typeface="Calibri"/>
             </a:endParaRPr>
           </a:p>
@@ -11879,10 +12509,10 @@
               <a:buNone/>
             </a:pPr>
             <a:r>
-              <a:rPr lang="fr-FR" sz="2000" dirty="0"/>
+              <a:rPr lang="fr-FR" sz="2000"/>
               <a:t> J’ai profité de mes points CPF pour faire cette formation.</a:t>
             </a:r>
-            <a:endParaRPr lang="fr-FR" sz="2000" dirty="0">
+            <a:endParaRPr lang="fr-FR" sz="2000">
               <a:cs typeface="Calibri"/>
             </a:endParaRPr>
           </a:p>
@@ -12289,7 +12919,7 @@
           <a:noFill/>
         </p:spPr>
         <p:txBody>
-          <a:bodyPr wrap="square" rtlCol="0">
+          <a:bodyPr wrap="square" rtlCol="0" anchor="t">
             <a:spAutoFit/>
           </a:bodyPr>
           <a:lstStyle/>
@@ -12304,38 +12934,61 @@
             </a:r>
             <a:r>
               <a:rPr lang="fr-FR"/>
-              <a:t> python </a:t>
+              <a:t> python </a:t>
             </a:r>
           </a:p>
           <a:p>
             <a:r>
               <a:rPr lang="fr-FR"/>
-              <a:t>j'ai crée un environnement virtuelle</a:t>
-            </a:r>
+              <a:t>j'ai </a:t>
+            </a:r>
+            <a:r>
+              <a:rPr lang="fr-FR" err="1"/>
+              <a:t>crée</a:t>
+            </a:r>
+            <a:r>
+              <a:rPr lang="fr-FR"/>
+              <a:t> un environnement virtuelle</a:t>
+            </a:r>
+            <a:endParaRPr lang="fr-FR">
+              <a:cs typeface="Calibri"/>
+            </a:endParaRPr>
           </a:p>
           <a:p>
             <a:r>
               <a:rPr lang="fr-FR"/>
               <a:t>avec le logiciel Virtual environnement</a:t>
             </a:r>
+            <a:endParaRPr lang="fr-FR">
+              <a:cs typeface="Calibri"/>
+            </a:endParaRPr>
           </a:p>
           <a:p>
             <a:r>
               <a:rPr lang="fr-FR"/>
               <a:t>ceci me permet de tester mon Project</a:t>
             </a:r>
+            <a:endParaRPr lang="fr-FR">
+              <a:cs typeface="Calibri"/>
+            </a:endParaRPr>
           </a:p>
           <a:p>
             <a:r>
               <a:rPr lang="fr-FR"/>
               <a:t>avec plusieurs version de python.</a:t>
             </a:r>
+            <a:endParaRPr lang="fr-FR">
+              <a:cs typeface="Calibri"/>
+            </a:endParaRPr>
           </a:p>
           <a:p>
             <a:r>
               <a:rPr lang="fr-FR"/>
-              <a:t>et de stocker mon travail  dans un endroit sur de mon pc</a:t>
-            </a:r>
+              <a:t>et de stocker mon travail  dans un endroit sure de mon pc</a:t>
+            </a:r>
+            <a:endParaRPr lang="fr-FR">
+              <a:cs typeface="Calibri"/>
+            </a:endParaRPr>
           </a:p>
         </p:txBody>
       </p:sp>
@@ -13288,8 +13941,8 @@
         </p:nvSpPr>
         <p:spPr>
           <a:xfrm>
-            <a:off x="6507060" y="1389776"/>
-            <a:ext cx="4742576" cy="3888244"/>
+            <a:off x="6842619" y="1389776"/>
+            <a:ext cx="4407017" cy="3760004"/>
           </a:xfrm>
           <a:prstGeom prst="rect">
             <a:avLst/>
@@ -13438,23 +14091,7 @@
               <a:rPr lang="fr-FR">
                 <a:cs typeface="Calibri"/>
               </a:rPr>
-              <a:t>          Mes variables sont en minuscule si il y        a deux mot .</a:t>
-            </a:r>
-          </a:p>
-          <a:p>
-            <a:pPr algn="ctr">
-              <a:lnSpc>
-                <a:spcPct val="90000"/>
-              </a:lnSpc>
-              <a:spcBef>
-                <a:spcPts val="1000"/>
-              </a:spcBef>
-            </a:pPr>
-            <a:r>
-              <a:rPr lang="fr-FR">
-                <a:cs typeface="Calibri"/>
-              </a:rPr>
-              <a:t>Je mets un tiret du bas centre .</a:t>
+              <a:t>         Mes variables sont en minuscule si il y a plus de un  mot .Je mets un tiret du bas au centre .</a:t>
             </a:r>
           </a:p>
           <a:p>

</xml_diff>